<commit_message>
Presentación mejorada por Julio Mérida Hoyos y Pablo Gamarro Lozano
</commit_message>
<xml_diff>
--- a/7_Presentacion/Presentacion.pptx
+++ b/7_Presentacion/Presentacion.pptx
@@ -1,6 +1,6 @@
 
 <file path=ppt/presentation.xml><?xml version="1.0" encoding="utf-8"?>
-<p:presentation xmlns:a="http://schemas.openxmlformats.org/drawingml/2006/main" xmlns:r="http://schemas.openxmlformats.org/officeDocument/2006/relationships" xmlns:p="http://schemas.openxmlformats.org/presentationml/2006/main" autoCompressPictures="0">
+<p:presentation xmlns:a="http://schemas.openxmlformats.org/drawingml/2006/main" xmlns:r="http://schemas.openxmlformats.org/officeDocument/2006/relationships" xmlns:p="http://schemas.openxmlformats.org/presentationml/2006/main" saveSubsetFonts="1" autoCompressPictures="0">
   <p:sldMasterIdLst>
     <p:sldMasterId id="2147483754" r:id="rId1"/>
   </p:sldMasterIdLst>
@@ -8,11 +8,16 @@
     <p:sldId id="256" r:id="rId2"/>
     <p:sldId id="257" r:id="rId3"/>
     <p:sldId id="258" r:id="rId4"/>
-    <p:sldId id="259" r:id="rId5"/>
-    <p:sldId id="260" r:id="rId6"/>
-    <p:sldId id="261" r:id="rId7"/>
-    <p:sldId id="263" r:id="rId8"/>
-    <p:sldId id="264" r:id="rId9"/>
+    <p:sldId id="267" r:id="rId5"/>
+    <p:sldId id="269" r:id="rId6"/>
+    <p:sldId id="270" r:id="rId7"/>
+    <p:sldId id="271" r:id="rId8"/>
+    <p:sldId id="268" r:id="rId9"/>
+    <p:sldId id="260" r:id="rId10"/>
+    <p:sldId id="261" r:id="rId11"/>
+    <p:sldId id="273" r:id="rId12"/>
+    <p:sldId id="263" r:id="rId13"/>
+    <p:sldId id="264" r:id="rId14"/>
   </p:sldIdLst>
   <p:sldSz cx="12192000" cy="6858000"/>
   <p:notesSz cx="6858000" cy="9144000"/>
@@ -111,6 +116,11 @@
       </a:defRPr>
     </a:lvl9pPr>
   </p:defaultTextStyle>
+  <p:extLst>
+    <p:ext uri="{EFAFB233-063F-42B5-8137-9DF3F51BA10A}">
+      <p15:sldGuideLst xmlns:p15="http://schemas.microsoft.com/office/powerpoint/2012/main"/>
+    </p:ext>
+  </p:extLst>
 </p:presentation>
 </file>
 
@@ -859,7 +869,7 @@
           <a:p>
             <a:fld id="{48A87A34-81AB-432B-8DAE-1953F412C126}" type="datetimeFigureOut">
               <a:rPr lang="en-US" smtClean="0"/>
-              <a:t>5/28/2018</a:t>
+              <a:t>5/29/18</a:t>
             </a:fld>
             <a:endParaRPr lang="en-US" dirty="0"/>
           </a:p>
@@ -901,7 +911,7 @@
           <a:p>
             <a:fld id="{6D22F896-40B5-4ADD-8801-0D06FADFA095}" type="slidenum">
               <a:rPr lang="en-US" smtClean="0"/>
-              <a:t>‹Nº›</a:t>
+              <a:t>‹Nr.›</a:t>
             </a:fld>
             <a:endParaRPr lang="en-US" dirty="0"/>
           </a:p>
@@ -1111,7 +1121,7 @@
             <a:fld id="{48A87A34-81AB-432B-8DAE-1953F412C126}" type="datetimeFigureOut">
               <a:rPr lang="en-US" smtClean="0"/>
               <a:pPr/>
-              <a:t>5/28/2018</a:t>
+              <a:t>5/29/18</a:t>
             </a:fld>
             <a:endParaRPr lang="en-US" dirty="0"/>
           </a:p>
@@ -1154,7 +1164,7 @@
             <a:fld id="{6D22F896-40B5-4ADD-8801-0D06FADFA095}" type="slidenum">
               <a:rPr lang="en-US" smtClean="0"/>
               <a:pPr/>
-              <a:t>‹Nº›</a:t>
+              <a:t>‹Nr.›</a:t>
             </a:fld>
             <a:endParaRPr lang="en-US" dirty="0"/>
           </a:p>
@@ -1427,7 +1437,7 @@
             <a:fld id="{48A87A34-81AB-432B-8DAE-1953F412C126}" type="datetimeFigureOut">
               <a:rPr lang="en-US" smtClean="0"/>
               <a:pPr/>
-              <a:t>5/28/2018</a:t>
+              <a:t>5/29/18</a:t>
             </a:fld>
             <a:endParaRPr lang="en-US" dirty="0"/>
           </a:p>
@@ -1470,7 +1480,7 @@
             <a:fld id="{6D22F896-40B5-4ADD-8801-0D06FADFA095}" type="slidenum">
               <a:rPr lang="en-US" smtClean="0"/>
               <a:pPr/>
-              <a:t>‹Nº›</a:t>
+              <a:t>‹Nr.›</a:t>
             </a:fld>
             <a:endParaRPr lang="en-US" dirty="0"/>
           </a:p>
@@ -1762,7 +1772,7 @@
             <a:fld id="{48A87A34-81AB-432B-8DAE-1953F412C126}" type="datetimeFigureOut">
               <a:rPr lang="en-US" smtClean="0"/>
               <a:pPr/>
-              <a:t>5/28/2018</a:t>
+              <a:t>5/29/18</a:t>
             </a:fld>
             <a:endParaRPr lang="en-US" dirty="0"/>
           </a:p>
@@ -1805,7 +1815,7 @@
             <a:fld id="{6D22F896-40B5-4ADD-8801-0D06FADFA095}" type="slidenum">
               <a:rPr lang="en-US" smtClean="0"/>
               <a:pPr/>
-              <a:t>‹Nº›</a:t>
+              <a:t>‹Nr.›</a:t>
             </a:fld>
             <a:endParaRPr lang="en-US" dirty="0"/>
           </a:p>
@@ -2078,7 +2088,7 @@
             <a:fld id="{48A87A34-81AB-432B-8DAE-1953F412C126}" type="datetimeFigureOut">
               <a:rPr lang="en-US" smtClean="0"/>
               <a:pPr/>
-              <a:t>5/28/2018</a:t>
+              <a:t>5/29/18</a:t>
             </a:fld>
             <a:endParaRPr lang="en-US" dirty="0"/>
           </a:p>
@@ -2121,7 +2131,7 @@
             <a:fld id="{6D22F896-40B5-4ADD-8801-0D06FADFA095}" type="slidenum">
               <a:rPr lang="en-US" smtClean="0"/>
               <a:pPr/>
-              <a:t>‹Nº›</a:t>
+              <a:t>‹Nr.›</a:t>
             </a:fld>
             <a:endParaRPr lang="en-US" dirty="0"/>
           </a:p>
@@ -2473,7 +2483,7 @@
             <a:fld id="{48A87A34-81AB-432B-8DAE-1953F412C126}" type="datetimeFigureOut">
               <a:rPr lang="en-US" smtClean="0"/>
               <a:pPr/>
-              <a:t>5/28/2018</a:t>
+              <a:t>5/29/18</a:t>
             </a:fld>
             <a:endParaRPr lang="en-US" dirty="0"/>
           </a:p>
@@ -2516,7 +2526,7 @@
             <a:fld id="{6D22F896-40B5-4ADD-8801-0D06FADFA095}" type="slidenum">
               <a:rPr lang="en-US" smtClean="0"/>
               <a:pPr/>
-              <a:t>‹Nº›</a:t>
+              <a:t>‹Nr.›</a:t>
             </a:fld>
             <a:endParaRPr lang="en-US" dirty="0"/>
           </a:p>
@@ -2644,7 +2654,7 @@
           <a:p>
             <a:fld id="{48A87A34-81AB-432B-8DAE-1953F412C126}" type="datetimeFigureOut">
               <a:rPr lang="en-US" smtClean="0"/>
-              <a:t>5/28/2018</a:t>
+              <a:t>5/29/18</a:t>
             </a:fld>
             <a:endParaRPr lang="en-US" dirty="0"/>
           </a:p>
@@ -2686,7 +2696,7 @@
           <a:p>
             <a:fld id="{6D22F896-40B5-4ADD-8801-0D06FADFA095}" type="slidenum">
               <a:rPr lang="en-US" smtClean="0"/>
-              <a:t>‹Nº›</a:t>
+              <a:t>‹Nr.›</a:t>
             </a:fld>
             <a:endParaRPr lang="en-US" dirty="0"/>
           </a:p>
@@ -2825,7 +2835,7 @@
             <a:fld id="{48A87A34-81AB-432B-8DAE-1953F412C126}" type="datetimeFigureOut">
               <a:rPr lang="en-US" smtClean="0"/>
               <a:pPr/>
-              <a:t>5/28/2018</a:t>
+              <a:t>5/29/18</a:t>
             </a:fld>
             <a:endParaRPr lang="en-US" dirty="0"/>
           </a:p>
@@ -2867,7 +2877,7 @@
           <a:p>
             <a:fld id="{6D22F896-40B5-4ADD-8801-0D06FADFA095}" type="slidenum">
               <a:rPr lang="en-US" smtClean="0"/>
-              <a:t>‹Nº›</a:t>
+              <a:t>‹Nr.›</a:t>
             </a:fld>
             <a:endParaRPr lang="en-US" dirty="0"/>
           </a:p>
@@ -2995,7 +3005,7 @@
           <a:p>
             <a:fld id="{48A87A34-81AB-432B-8DAE-1953F412C126}" type="datetimeFigureOut">
               <a:rPr lang="en-US" smtClean="0"/>
-              <a:t>5/28/2018</a:t>
+              <a:t>5/29/18</a:t>
             </a:fld>
             <a:endParaRPr lang="en-US" dirty="0"/>
           </a:p>
@@ -3037,7 +3047,7 @@
           <a:p>
             <a:fld id="{6D22F896-40B5-4ADD-8801-0D06FADFA095}" type="slidenum">
               <a:rPr lang="en-US" smtClean="0"/>
-              <a:t>‹Nº›</a:t>
+              <a:t>‹Nr.›</a:t>
             </a:fld>
             <a:endParaRPr lang="en-US" dirty="0"/>
           </a:p>
@@ -3243,7 +3253,7 @@
             <a:fld id="{48A87A34-81AB-432B-8DAE-1953F412C126}" type="datetimeFigureOut">
               <a:rPr lang="en-US" smtClean="0"/>
               <a:pPr/>
-              <a:t>5/28/2018</a:t>
+              <a:t>5/29/18</a:t>
             </a:fld>
             <a:endParaRPr lang="en-US" dirty="0"/>
           </a:p>
@@ -3285,7 +3295,7 @@
           <a:p>
             <a:fld id="{6D22F896-40B5-4ADD-8801-0D06FADFA095}" type="slidenum">
               <a:rPr lang="en-US" smtClean="0"/>
-              <a:t>‹Nº›</a:t>
+              <a:t>‹Nr.›</a:t>
             </a:fld>
             <a:endParaRPr lang="en-US" dirty="0"/>
           </a:p>
@@ -3475,7 +3485,7 @@
           <a:p>
             <a:fld id="{48A87A34-81AB-432B-8DAE-1953F412C126}" type="datetimeFigureOut">
               <a:rPr lang="en-US" smtClean="0"/>
-              <a:t>5/28/2018</a:t>
+              <a:t>5/29/18</a:t>
             </a:fld>
             <a:endParaRPr lang="en-US" dirty="0"/>
           </a:p>
@@ -3517,7 +3527,7 @@
           <a:p>
             <a:fld id="{6D22F896-40B5-4ADD-8801-0D06FADFA095}" type="slidenum">
               <a:rPr lang="en-US" smtClean="0"/>
-              <a:t>‹Nº›</a:t>
+              <a:t>‹Nr.›</a:t>
             </a:fld>
             <a:endParaRPr lang="en-US" dirty="0"/>
           </a:p>
@@ -3849,7 +3859,7 @@
           <a:p>
             <a:fld id="{48A87A34-81AB-432B-8DAE-1953F412C126}" type="datetimeFigureOut">
               <a:rPr lang="en-US" smtClean="0"/>
-              <a:t>5/28/2018</a:t>
+              <a:t>5/29/18</a:t>
             </a:fld>
             <a:endParaRPr lang="en-US" dirty="0"/>
           </a:p>
@@ -3891,7 +3901,7 @@
           <a:p>
             <a:fld id="{6D22F896-40B5-4ADD-8801-0D06FADFA095}" type="slidenum">
               <a:rPr lang="en-US" smtClean="0"/>
-              <a:t>‹Nº›</a:t>
+              <a:t>‹Nr.›</a:t>
             </a:fld>
             <a:endParaRPr lang="en-US" dirty="0"/>
           </a:p>
@@ -3972,7 +3982,7 @@
           <a:p>
             <a:fld id="{48A87A34-81AB-432B-8DAE-1953F412C126}" type="datetimeFigureOut">
               <a:rPr lang="en-US" smtClean="0"/>
-              <a:t>5/28/2018</a:t>
+              <a:t>5/29/18</a:t>
             </a:fld>
             <a:endParaRPr lang="en-US" dirty="0"/>
           </a:p>
@@ -4014,7 +4024,7 @@
           <a:p>
             <a:fld id="{6D22F896-40B5-4ADD-8801-0D06FADFA095}" type="slidenum">
               <a:rPr lang="en-US" smtClean="0"/>
-              <a:t>‹Nº›</a:t>
+              <a:t>‹Nr.›</a:t>
             </a:fld>
             <a:endParaRPr lang="en-US" dirty="0"/>
           </a:p>
@@ -4067,7 +4077,7 @@
           <a:p>
             <a:fld id="{48A87A34-81AB-432B-8DAE-1953F412C126}" type="datetimeFigureOut">
               <a:rPr lang="en-US" smtClean="0"/>
-              <a:t>5/28/2018</a:t>
+              <a:t>5/29/18</a:t>
             </a:fld>
             <a:endParaRPr lang="en-US" dirty="0"/>
           </a:p>
@@ -4109,7 +4119,7 @@
           <a:p>
             <a:fld id="{6D22F896-40B5-4ADD-8801-0D06FADFA095}" type="slidenum">
               <a:rPr lang="en-US" smtClean="0"/>
-              <a:t>‹Nº›</a:t>
+              <a:t>‹Nr.›</a:t>
             </a:fld>
             <a:endParaRPr lang="en-US" dirty="0"/>
           </a:p>
@@ -4322,7 +4332,7 @@
           <a:p>
             <a:fld id="{48A87A34-81AB-432B-8DAE-1953F412C126}" type="datetimeFigureOut">
               <a:rPr lang="en-US" smtClean="0"/>
-              <a:t>5/28/2018</a:t>
+              <a:t>5/29/18</a:t>
             </a:fld>
             <a:endParaRPr lang="en-US" dirty="0"/>
           </a:p>
@@ -4364,7 +4374,7 @@
           <a:p>
             <a:fld id="{6D22F896-40B5-4ADD-8801-0D06FADFA095}" type="slidenum">
               <a:rPr lang="en-US" smtClean="0"/>
-              <a:t>‹Nº›</a:t>
+              <a:t>‹Nr.›</a:t>
             </a:fld>
             <a:endParaRPr lang="en-US" dirty="0"/>
           </a:p>
@@ -4604,7 +4614,7 @@
           <a:p>
             <a:fld id="{6D22F896-40B5-4ADD-8801-0D06FADFA095}" type="slidenum">
               <a:rPr lang="en-US" smtClean="0"/>
-              <a:t>‹Nº›</a:t>
+              <a:t>‹Nr.›</a:t>
             </a:fld>
             <a:endParaRPr lang="en-US" dirty="0"/>
           </a:p>
@@ -4627,7 +4637,7 @@
           <a:p>
             <a:fld id="{48A87A34-81AB-432B-8DAE-1953F412C126}" type="datetimeFigureOut">
               <a:rPr lang="en-US" smtClean="0"/>
-              <a:t>5/28/2018</a:t>
+              <a:t>5/29/18</a:t>
             </a:fld>
             <a:endParaRPr lang="en-US" dirty="0"/>
           </a:p>
@@ -5330,7 +5340,7 @@
             <a:fld id="{48A87A34-81AB-432B-8DAE-1953F412C126}" type="datetimeFigureOut">
               <a:rPr lang="en-US" smtClean="0"/>
               <a:pPr/>
-              <a:t>5/28/2018</a:t>
+              <a:t>5/29/18</a:t>
             </a:fld>
             <a:endParaRPr lang="en-US" dirty="0"/>
           </a:p>
@@ -5407,7 +5417,7 @@
             <a:fld id="{6D22F896-40B5-4ADD-8801-0D06FADFA095}" type="slidenum">
               <a:rPr lang="en-US" smtClean="0"/>
               <a:pPr/>
-              <a:t>‹Nº›</a:t>
+              <a:t>‹Nr.›</a:t>
             </a:fld>
             <a:endParaRPr lang="en-US" dirty="0"/>
           </a:p>
@@ -5874,7 +5884,7 @@
           <p:cNvPr id="2" name="Título 1">
             <a:extLst>
               <a:ext uri="{FF2B5EF4-FFF2-40B4-BE49-F238E27FC236}">
-                <a16:creationId xmlns:a16="http://schemas.microsoft.com/office/drawing/2014/main" id="{FD8AECF1-5466-4FD5-817B-A14A6B4BA43F}"/>
+                <a16:creationId xmlns:a16="http://schemas.microsoft.com/office/drawing/2014/main" xmlns="" id="{FD8AECF1-5466-4FD5-817B-A14A6B4BA43F}"/>
               </a:ext>
             </a:extLst>
           </p:cNvPr>
@@ -5906,29 +5916,7 @@
                 </a:solidFill>
                 <a:latin typeface="Colonna MT" panose="04020805060202030203" pitchFamily="82" charset="0"/>
               </a:rPr>
-              <a:t>“Change </a:t>
-            </a:r>
-            <a:r>
-              <a:rPr lang="es-ES" sz="8000" b="1" dirty="0" err="1">
-                <a:solidFill>
-                  <a:schemeClr val="accent2">
-                    <a:lumMod val="75000"/>
-                  </a:schemeClr>
-                </a:solidFill>
-                <a:latin typeface="Colonna MT" panose="04020805060202030203" pitchFamily="82" charset="0"/>
-              </a:rPr>
-              <a:t>Your</a:t>
-            </a:r>
-            <a:r>
-              <a:rPr lang="es-ES" sz="8000" b="1" dirty="0">
-                <a:solidFill>
-                  <a:schemeClr val="accent2">
-                    <a:lumMod val="75000"/>
-                  </a:schemeClr>
-                </a:solidFill>
-                <a:latin typeface="Colonna MT" panose="04020805060202030203" pitchFamily="82" charset="0"/>
-              </a:rPr>
-              <a:t> City”</a:t>
+              <a:t>“Change Your City”</a:t>
             </a:r>
           </a:p>
         </p:txBody>
@@ -5938,7 +5926,7 @@
           <p:cNvPr id="3" name="Subtítulo 2">
             <a:extLst>
               <a:ext uri="{FF2B5EF4-FFF2-40B4-BE49-F238E27FC236}">
-                <a16:creationId xmlns:a16="http://schemas.microsoft.com/office/drawing/2014/main" id="{36F52D52-3AF1-4AB8-AB2F-500D197725F8}"/>
+                <a16:creationId xmlns:a16="http://schemas.microsoft.com/office/drawing/2014/main" xmlns="" id="{36F52D52-3AF1-4AB8-AB2F-500D197725F8}"/>
               </a:ext>
             </a:extLst>
           </p:cNvPr>
@@ -5949,7 +5937,12 @@
             <p:ph type="subTitle" idx="1"/>
           </p:nvPr>
         </p:nvSpPr>
-        <p:spPr/>
+        <p:spPr>
+          <a:xfrm>
+            <a:off x="1706183" y="4376653"/>
+            <a:ext cx="7766936" cy="1096899"/>
+          </a:xfrm>
+        </p:spPr>
         <p:txBody>
           <a:bodyPr/>
           <a:lstStyle/>
@@ -5974,198 +5967,7 @@
 </p:sld>
 </file>
 
-<file path=ppt/slides/slide2.xml><?xml version="1.0" encoding="utf-8"?>
-<p:sld xmlns:a="http://schemas.openxmlformats.org/drawingml/2006/main" xmlns:r="http://schemas.openxmlformats.org/officeDocument/2006/relationships" xmlns:p="http://schemas.openxmlformats.org/presentationml/2006/main">
-  <p:cSld>
-    <p:bg>
-      <p:bgPr>
-        <a:blipFill dpi="0" rotWithShape="1">
-          <a:blip r:embed="rId2">
-            <a:lum/>
-          </a:blip>
-          <a:srcRect/>
-          <a:stretch>
-            <a:fillRect t="-6000" b="-6000"/>
-          </a:stretch>
-        </a:blipFill>
-        <a:effectLst/>
-      </p:bgPr>
-    </p:bg>
-    <p:spTree>
-      <p:nvGrpSpPr>
-        <p:cNvPr id="1" name=""/>
-        <p:cNvGrpSpPr/>
-        <p:nvPr/>
-      </p:nvGrpSpPr>
-      <p:grpSpPr>
-        <a:xfrm>
-          <a:off x="0" y="0"/>
-          <a:ext cx="0" cy="0"/>
-          <a:chOff x="0" y="0"/>
-          <a:chExt cx="0" cy="0"/>
-        </a:xfrm>
-      </p:grpSpPr>
-      <p:sp>
-        <p:nvSpPr>
-          <p:cNvPr id="2" name="Título 1">
-            <a:extLst>
-              <a:ext uri="{FF2B5EF4-FFF2-40B4-BE49-F238E27FC236}">
-                <a16:creationId xmlns:a16="http://schemas.microsoft.com/office/drawing/2014/main" id="{6C561DC4-512B-4693-AAA6-F0784619631E}"/>
-              </a:ext>
-            </a:extLst>
-          </p:cNvPr>
-          <p:cNvSpPr>
-            <a:spLocks noGrp="1"/>
-          </p:cNvSpPr>
-          <p:nvPr>
-            <p:ph type="title"/>
-          </p:nvPr>
-        </p:nvSpPr>
-        <p:spPr/>
-        <p:txBody>
-          <a:bodyPr/>
-          <a:lstStyle/>
-          <a:p>
-            <a:r>
-              <a:rPr lang="es-ES" dirty="0"/>
-              <a:t>Índice</a:t>
-            </a:r>
-          </a:p>
-        </p:txBody>
-      </p:sp>
-      <p:sp>
-        <p:nvSpPr>
-          <p:cNvPr id="3" name="Marcador de contenido 2">
-            <a:extLst>
-              <a:ext uri="{FF2B5EF4-FFF2-40B4-BE49-F238E27FC236}">
-                <a16:creationId xmlns:a16="http://schemas.microsoft.com/office/drawing/2014/main" id="{94529F7B-DC78-4DEE-9A07-E09F4DFF9ACE}"/>
-              </a:ext>
-            </a:extLst>
-          </p:cNvPr>
-          <p:cNvSpPr>
-            <a:spLocks noGrp="1"/>
-          </p:cNvSpPr>
-          <p:nvPr>
-            <p:ph idx="1"/>
-          </p:nvPr>
-        </p:nvSpPr>
-        <p:spPr/>
-        <p:txBody>
-          <a:bodyPr/>
-          <a:lstStyle/>
-          <a:p>
-            <a:pPr>
-              <a:buFont typeface="+mj-lt"/>
-              <a:buAutoNum type="arabicPeriod"/>
-            </a:pPr>
-            <a:r>
-              <a:rPr lang="es-ES" dirty="0">
-                <a:solidFill>
-                  <a:schemeClr val="bg1"/>
-                </a:solidFill>
-              </a:rPr>
-              <a:t>Idea y objetivos</a:t>
-            </a:r>
-          </a:p>
-          <a:p>
-            <a:pPr>
-              <a:buFont typeface="+mj-lt"/>
-              <a:buAutoNum type="arabicPeriod"/>
-            </a:pPr>
-            <a:r>
-              <a:rPr lang="es-ES" dirty="0">
-                <a:solidFill>
-                  <a:schemeClr val="bg1"/>
-                </a:solidFill>
-              </a:rPr>
-              <a:t>Casos de uso</a:t>
-            </a:r>
-          </a:p>
-          <a:p>
-            <a:pPr>
-              <a:buFont typeface="+mj-lt"/>
-              <a:buAutoNum type="arabicPeriod"/>
-            </a:pPr>
-            <a:r>
-              <a:rPr lang="es-ES" dirty="0">
-                <a:solidFill>
-                  <a:schemeClr val="bg1"/>
-                </a:solidFill>
-              </a:rPr>
-              <a:t>Diagramas de clase</a:t>
-            </a:r>
-          </a:p>
-          <a:p>
-            <a:pPr>
-              <a:buFont typeface="+mj-lt"/>
-              <a:buAutoNum type="arabicPeriod"/>
-            </a:pPr>
-            <a:r>
-              <a:rPr lang="es-ES" dirty="0">
-                <a:solidFill>
-                  <a:schemeClr val="bg1"/>
-                </a:solidFill>
-              </a:rPr>
-              <a:t>Demo time</a:t>
-            </a:r>
-          </a:p>
-          <a:p>
-            <a:pPr>
-              <a:buFont typeface="+mj-lt"/>
-              <a:buAutoNum type="arabicPeriod"/>
-            </a:pPr>
-            <a:r>
-              <a:rPr lang="es-ES" dirty="0">
-                <a:solidFill>
-                  <a:schemeClr val="bg1"/>
-                </a:solidFill>
-              </a:rPr>
-              <a:t>Conclusiones</a:t>
-            </a:r>
-          </a:p>
-          <a:p>
-            <a:pPr>
-              <a:buFont typeface="+mj-lt"/>
-              <a:buAutoNum type="arabicPeriod"/>
-            </a:pPr>
-            <a:r>
-              <a:rPr lang="es-ES" dirty="0">
-                <a:solidFill>
-                  <a:schemeClr val="bg1"/>
-                </a:solidFill>
-              </a:rPr>
-              <a:t>Viva </a:t>
-            </a:r>
-            <a:r>
-              <a:rPr lang="es-ES" dirty="0" err="1">
-                <a:solidFill>
-                  <a:schemeClr val="bg1"/>
-                </a:solidFill>
-              </a:rPr>
-              <a:t>españa</a:t>
-            </a:r>
-            <a:endParaRPr lang="es-ES" dirty="0">
-              <a:solidFill>
-                <a:schemeClr val="bg1"/>
-              </a:solidFill>
-            </a:endParaRPr>
-          </a:p>
-        </p:txBody>
-      </p:sp>
-    </p:spTree>
-    <p:extLst>
-      <p:ext uri="{BB962C8B-B14F-4D97-AF65-F5344CB8AC3E}">
-        <p14:creationId xmlns:p14="http://schemas.microsoft.com/office/powerpoint/2010/main" val="2690464259"/>
-      </p:ext>
-    </p:extLst>
-  </p:cSld>
-  <p:clrMapOvr>
-    <a:masterClrMapping/>
-  </p:clrMapOvr>
-</p:sld>
-</file>
-
-<file path=ppt/slides/slide3.xml><?xml version="1.0" encoding="utf-8"?>
+<file path=ppt/slides/slide10.xml><?xml version="1.0" encoding="utf-8"?>
 <p:sld xmlns:a="http://schemas.openxmlformats.org/drawingml/2006/main" xmlns:r="http://schemas.openxmlformats.org/officeDocument/2006/relationships" xmlns:p="http://schemas.openxmlformats.org/presentationml/2006/main">
   <p:cSld>
     <p:bg>
@@ -6201,7 +6003,7 @@
           <p:cNvPr id="2" name="Título 1">
             <a:extLst>
               <a:ext uri="{FF2B5EF4-FFF2-40B4-BE49-F238E27FC236}">
-                <a16:creationId xmlns:a16="http://schemas.microsoft.com/office/drawing/2014/main" id="{6C561DC4-512B-4693-AAA6-F0784619631E}"/>
+                <a16:creationId xmlns:a16="http://schemas.microsoft.com/office/drawing/2014/main" xmlns="" id="{CFB490EC-9EFA-41A1-AD47-69164ED0A8CE}"/>
               </a:ext>
             </a:extLst>
           </p:cNvPr>
@@ -6212,118 +6014,58 @@
             <p:ph type="title"/>
           </p:nvPr>
         </p:nvSpPr>
+        <p:spPr/>
+        <p:txBody>
+          <a:bodyPr/>
+          <a:lstStyle/>
+          <a:p>
+            <a:r>
+              <a:rPr lang="es-ES" dirty="0">
+                <a:solidFill>
+                  <a:schemeClr val="accent2">
+                    <a:lumMod val="75000"/>
+                  </a:schemeClr>
+                </a:solidFill>
+              </a:rPr>
+              <a:t>Demo Time</a:t>
+            </a:r>
+          </a:p>
+        </p:txBody>
+      </p:sp>
+      <p:pic>
+        <p:nvPicPr>
+          <p:cNvPr id="6" name="Imagen 5"/>
+          <p:cNvPicPr>
+            <a:picLocks noChangeAspect="1"/>
+          </p:cNvPicPr>
+          <p:nvPr/>
+        </p:nvPicPr>
+        <p:blipFill>
+          <a:blip r:embed="rId3">
+            <a:extLst>
+              <a:ext uri="{28A0092B-C50C-407E-A947-70E740481C1C}">
+                <a14:useLocalDpi xmlns:a14="http://schemas.microsoft.com/office/drawing/2010/main" val="0"/>
+              </a:ext>
+            </a:extLst>
+          </a:blip>
+          <a:stretch>
+            <a:fillRect/>
+          </a:stretch>
+        </p:blipFill>
         <p:spPr>
           <a:xfrm>
-            <a:off x="408051" y="184826"/>
-            <a:ext cx="8596668" cy="1320800"/>
+            <a:off x="2136265" y="1478338"/>
+            <a:ext cx="6349859" cy="3432356"/>
           </a:xfrm>
+          <a:prstGeom prst="rect">
+            <a:avLst/>
+          </a:prstGeom>
         </p:spPr>
-        <p:txBody>
-          <a:bodyPr/>
-          <a:lstStyle/>
-          <a:p>
-            <a:r>
-              <a:rPr lang="es-ES" dirty="0">
-                <a:solidFill>
-                  <a:schemeClr val="accent2">
-                    <a:lumMod val="75000"/>
-                  </a:schemeClr>
-                </a:solidFill>
-              </a:rPr>
-              <a:t>¿Quiénes somos?</a:t>
-            </a:r>
-          </a:p>
-        </p:txBody>
-      </p:sp>
-      <p:sp>
-        <p:nvSpPr>
-          <p:cNvPr id="3" name="Marcador de contenido 2">
-            <a:extLst>
-              <a:ext uri="{FF2B5EF4-FFF2-40B4-BE49-F238E27FC236}">
-                <a16:creationId xmlns:a16="http://schemas.microsoft.com/office/drawing/2014/main" id="{94529F7B-DC78-4DEE-9A07-E09F4DFF9ACE}"/>
-              </a:ext>
-            </a:extLst>
-          </p:cNvPr>
-          <p:cNvSpPr>
-            <a:spLocks noGrp="1"/>
-          </p:cNvSpPr>
-          <p:nvPr>
-            <p:ph idx="1"/>
-          </p:nvPr>
-        </p:nvSpPr>
-        <p:spPr>
-          <a:xfrm>
-            <a:off x="122857" y="1031132"/>
-            <a:ext cx="9167057" cy="4562758"/>
-          </a:xfrm>
-        </p:spPr>
-        <p:txBody>
-          <a:bodyPr/>
-          <a:lstStyle/>
-          <a:p>
-            <a:r>
-              <a:rPr lang="es-ES" dirty="0" err="1">
-                <a:solidFill>
-                  <a:schemeClr val="accent2">
-                    <a:lumMod val="75000"/>
-                  </a:schemeClr>
-                </a:solidFill>
-              </a:rPr>
-              <a:t>StartUP</a:t>
-            </a:r>
-            <a:r>
-              <a:rPr lang="es-ES" dirty="0">
-                <a:solidFill>
-                  <a:schemeClr val="accent2">
-                    <a:lumMod val="75000"/>
-                  </a:schemeClr>
-                </a:solidFill>
-              </a:rPr>
-              <a:t> formada por 7 estudiantes de Ingeniería de Software que a partir de una idea con una trasfondo social, esperan salir a flote en el mundo del software</a:t>
-            </a:r>
-          </a:p>
-          <a:p>
-            <a:r>
-              <a:rPr lang="es-ES" dirty="0">
-                <a:solidFill>
-                  <a:schemeClr val="accent2">
-                    <a:lumMod val="75000"/>
-                  </a:schemeClr>
-                </a:solidFill>
-              </a:rPr>
-              <a:t>Nuestra idea: Aplicación enfocada a la mejora y mantenimiento de las ciudades (Proyectos y Desperfectos) mejorando la conexión entre Ayuntamientos y Ciudadanos.</a:t>
-            </a:r>
-          </a:p>
-          <a:p>
-            <a:r>
-              <a:rPr lang="es-ES" dirty="0">
-                <a:solidFill>
-                  <a:schemeClr val="accent2">
-                    <a:lumMod val="75000"/>
-                  </a:schemeClr>
-                </a:solidFill>
-              </a:rPr>
-              <a:t>Nuestra motivación: Los numerosos desperfectos y la necesidad de infraestructura o cambios en las ciudades y la forma de manejar esta información entre Ciudadanos y Ayuntamiento.</a:t>
-            </a:r>
-          </a:p>
-          <a:p>
-            <a:r>
-              <a:rPr lang="es-ES" dirty="0">
-                <a:solidFill>
-                  <a:schemeClr val="accent2">
-                    <a:lumMod val="75000"/>
-                  </a:schemeClr>
-                </a:solidFill>
-              </a:rPr>
-              <a:t>Nuestro objetivo: Crear una plataforma en la que los usuarios pueden aportar ideas para mejorar la ciudad donde residen. Apoyando las que son más relevantes con sus firmas.</a:t>
-            </a:r>
-          </a:p>
-        </p:txBody>
-      </p:sp>
+      </p:pic>
     </p:spTree>
     <p:extLst>
       <p:ext uri="{BB962C8B-B14F-4D97-AF65-F5344CB8AC3E}">
-        <p14:creationId xmlns:p14="http://schemas.microsoft.com/office/powerpoint/2010/main" val="396919000"/>
+        <p14:creationId xmlns:p14="http://schemas.microsoft.com/office/powerpoint/2010/main" val="3885114006"/>
       </p:ext>
     </p:extLst>
   </p:cSld>
@@ -6333,7 +6075,7 @@
 </p:sld>
 </file>
 
-<file path=ppt/slides/slide4.xml><?xml version="1.0" encoding="utf-8"?>
+<file path=ppt/slides/slide11.xml><?xml version="1.0" encoding="utf-8"?>
 <p:sld xmlns:a="http://schemas.openxmlformats.org/drawingml/2006/main" xmlns:r="http://schemas.openxmlformats.org/officeDocument/2006/relationships" xmlns:p="http://schemas.openxmlformats.org/presentationml/2006/main">
   <p:cSld>
     <p:bg>
@@ -6369,7 +6111,7 @@
           <p:cNvPr id="2" name="Título 1">
             <a:extLst>
               <a:ext uri="{FF2B5EF4-FFF2-40B4-BE49-F238E27FC236}">
-                <a16:creationId xmlns:a16="http://schemas.microsoft.com/office/drawing/2014/main" id="{CA27B51E-7389-4064-8284-3A9B3C9A4BE0}"/>
+                <a16:creationId xmlns:a16="http://schemas.microsoft.com/office/drawing/2014/main" xmlns="" id="{6C561DC4-512B-4693-AAA6-F0784619631E}"/>
               </a:ext>
             </a:extLst>
           </p:cNvPr>
@@ -6380,60 +6122,127 @@
             <p:ph type="title"/>
           </p:nvPr>
         </p:nvSpPr>
-        <p:spPr/>
+        <p:spPr>
+          <a:xfrm>
+            <a:off x="408051" y="184826"/>
+            <a:ext cx="8596668" cy="1320800"/>
+          </a:xfrm>
+        </p:spPr>
         <p:txBody>
           <a:bodyPr/>
           <a:lstStyle/>
           <a:p>
             <a:r>
-              <a:rPr lang="es-ES" dirty="0">
+              <a:rPr lang="es-ES" dirty="0" smtClean="0">
                 <a:solidFill>
                   <a:schemeClr val="accent2">
                     <a:lumMod val="75000"/>
                   </a:schemeClr>
                 </a:solidFill>
               </a:rPr>
-              <a:t>Casos de Uso</a:t>
-            </a:r>
-          </a:p>
-        </p:txBody>
-      </p:sp>
-      <p:pic>
-        <p:nvPicPr>
-          <p:cNvPr id="4" name="Marcador de contenido 3">
+              <a:t>Conclusión</a:t>
+            </a:r>
+            <a:endParaRPr lang="es-ES" dirty="0">
+              <a:solidFill>
+                <a:schemeClr val="accent2">
+                  <a:lumMod val="75000"/>
+                </a:schemeClr>
+              </a:solidFill>
+            </a:endParaRPr>
+          </a:p>
+        </p:txBody>
+      </p:sp>
+      <p:sp>
+        <p:nvSpPr>
+          <p:cNvPr id="3" name="Marcador de contenido 2">
             <a:extLst>
               <a:ext uri="{FF2B5EF4-FFF2-40B4-BE49-F238E27FC236}">
-                <a16:creationId xmlns:a16="http://schemas.microsoft.com/office/drawing/2014/main" id="{C1D11C91-4381-4217-BBBA-BDF97F9133FA}"/>
+                <a16:creationId xmlns:a16="http://schemas.microsoft.com/office/drawing/2014/main" xmlns="" id="{94529F7B-DC78-4DEE-9A07-E09F4DFF9ACE}"/>
               </a:ext>
             </a:extLst>
           </p:cNvPr>
-          <p:cNvPicPr>
-            <a:picLocks noGrp="1" noChangeAspect="1"/>
-          </p:cNvPicPr>
+          <p:cNvSpPr>
+            <a:spLocks noGrp="1"/>
+          </p:cNvSpPr>
           <p:nvPr>
             <p:ph idx="1"/>
           </p:nvPr>
-        </p:nvPicPr>
-        <p:blipFill>
-          <a:blip r:embed="rId3"/>
-          <a:stretch>
-            <a:fillRect/>
-          </a:stretch>
-        </p:blipFill>
+        </p:nvSpPr>
         <p:spPr>
           <a:xfrm>
-            <a:off x="1475002" y="1682691"/>
-            <a:ext cx="6316853" cy="4565709"/>
+            <a:off x="122857" y="1031132"/>
+            <a:ext cx="9167057" cy="4562758"/>
           </a:xfrm>
-          <a:prstGeom prst="rect">
-            <a:avLst/>
-          </a:prstGeom>
         </p:spPr>
-      </p:pic>
+        <p:txBody>
+          <a:bodyPr/>
+          <a:lstStyle/>
+          <a:p>
+            <a:r>
+              <a:rPr lang="es-ES" dirty="0" smtClean="0">
+                <a:solidFill>
+                  <a:schemeClr val="accent2">
+                    <a:lumMod val="75000"/>
+                  </a:schemeClr>
+                </a:solidFill>
+              </a:rPr>
+              <a:t>Entender mejor que es la Ingeniería del Software.</a:t>
+            </a:r>
+            <a:endParaRPr lang="es-ES" dirty="0">
+              <a:solidFill>
+                <a:schemeClr val="accent2">
+                  <a:lumMod val="75000"/>
+                </a:schemeClr>
+              </a:solidFill>
+            </a:endParaRPr>
+          </a:p>
+          <a:p>
+            <a:r>
+              <a:rPr lang="es-ES" dirty="0">
+                <a:solidFill>
+                  <a:schemeClr val="accent2">
+                    <a:lumMod val="75000"/>
+                  </a:schemeClr>
+                </a:solidFill>
+              </a:rPr>
+              <a:t>Herramientas aprendidas</a:t>
+            </a:r>
+            <a:r>
+              <a:rPr lang="es-ES" dirty="0" smtClean="0">
+                <a:solidFill>
+                  <a:schemeClr val="accent2">
+                    <a:lumMod val="75000"/>
+                  </a:schemeClr>
+                </a:solidFill>
+              </a:rPr>
+              <a:t>.</a:t>
+            </a:r>
+          </a:p>
+          <a:p>
+            <a:r>
+              <a:rPr lang="es-ES" dirty="0" smtClean="0">
+                <a:solidFill>
+                  <a:schemeClr val="accent2">
+                    <a:lumMod val="75000"/>
+                  </a:schemeClr>
+                </a:solidFill>
+              </a:rPr>
+              <a:t>Problemas con la implementación.</a:t>
+            </a:r>
+            <a:endParaRPr lang="es-ES" dirty="0">
+              <a:solidFill>
+                <a:schemeClr val="accent2">
+                  <a:lumMod val="75000"/>
+                </a:schemeClr>
+              </a:solidFill>
+            </a:endParaRPr>
+          </a:p>
+        </p:txBody>
+      </p:sp>
     </p:spTree>
     <p:extLst>
       <p:ext uri="{BB962C8B-B14F-4D97-AF65-F5344CB8AC3E}">
-        <p14:creationId xmlns:p14="http://schemas.microsoft.com/office/powerpoint/2010/main" val="1140021495"/>
+        <p14:creationId xmlns:p14="http://schemas.microsoft.com/office/powerpoint/2010/main" val="2046819135"/>
       </p:ext>
     </p:extLst>
   </p:cSld>
@@ -6443,220 +6252,7 @@
 </p:sld>
 </file>
 
-<file path=ppt/slides/slide5.xml><?xml version="1.0" encoding="utf-8"?>
-<p:sld xmlns:a="http://schemas.openxmlformats.org/drawingml/2006/main" xmlns:r="http://schemas.openxmlformats.org/officeDocument/2006/relationships" xmlns:p="http://schemas.openxmlformats.org/presentationml/2006/main">
-  <p:cSld>
-    <p:bg>
-      <p:bgPr>
-        <a:blipFill dpi="0" rotWithShape="1">
-          <a:blip r:embed="rId2">
-            <a:lum/>
-          </a:blip>
-          <a:srcRect/>
-          <a:stretch>
-            <a:fillRect/>
-          </a:stretch>
-        </a:blipFill>
-        <a:effectLst/>
-      </p:bgPr>
-    </p:bg>
-    <p:spTree>
-      <p:nvGrpSpPr>
-        <p:cNvPr id="1" name=""/>
-        <p:cNvGrpSpPr/>
-        <p:nvPr/>
-      </p:nvGrpSpPr>
-      <p:grpSpPr>
-        <a:xfrm>
-          <a:off x="0" y="0"/>
-          <a:ext cx="0" cy="0"/>
-          <a:chOff x="0" y="0"/>
-          <a:chExt cx="0" cy="0"/>
-        </a:xfrm>
-      </p:grpSpPr>
-      <p:sp>
-        <p:nvSpPr>
-          <p:cNvPr id="2" name="Título 1">
-            <a:extLst>
-              <a:ext uri="{FF2B5EF4-FFF2-40B4-BE49-F238E27FC236}">
-                <a16:creationId xmlns:a16="http://schemas.microsoft.com/office/drawing/2014/main" id="{90D38644-861F-49D4-961C-8125C843D401}"/>
-              </a:ext>
-            </a:extLst>
-          </p:cNvPr>
-          <p:cNvSpPr>
-            <a:spLocks noGrp="1"/>
-          </p:cNvSpPr>
-          <p:nvPr>
-            <p:ph type="title"/>
-          </p:nvPr>
-        </p:nvSpPr>
-        <p:spPr/>
-        <p:txBody>
-          <a:bodyPr/>
-          <a:lstStyle/>
-          <a:p>
-            <a:r>
-              <a:rPr lang="es-ES" dirty="0">
-                <a:solidFill>
-                  <a:schemeClr val="accent2">
-                    <a:lumMod val="75000"/>
-                  </a:schemeClr>
-                </a:solidFill>
-              </a:rPr>
-              <a:t>Diagrama de clases</a:t>
-            </a:r>
-          </a:p>
-        </p:txBody>
-      </p:sp>
-      <p:pic>
-        <p:nvPicPr>
-          <p:cNvPr id="4" name="Marcador de contenido 3">
-            <a:extLst>
-              <a:ext uri="{FF2B5EF4-FFF2-40B4-BE49-F238E27FC236}">
-                <a16:creationId xmlns:a16="http://schemas.microsoft.com/office/drawing/2014/main" id="{03417A3F-628A-4683-A185-59E13DAF4D5D}"/>
-              </a:ext>
-            </a:extLst>
-          </p:cNvPr>
-          <p:cNvPicPr>
-            <a:picLocks noGrp="1" noChangeAspect="1"/>
-          </p:cNvPicPr>
-          <p:nvPr>
-            <p:ph idx="1"/>
-          </p:nvPr>
-        </p:nvPicPr>
-        <p:blipFill>
-          <a:blip r:embed="rId3"/>
-          <a:stretch>
-            <a:fillRect/>
-          </a:stretch>
-        </p:blipFill>
-        <p:spPr>
-          <a:xfrm>
-            <a:off x="733883" y="2160588"/>
-            <a:ext cx="8484272" cy="3881437"/>
-          </a:xfrm>
-          <a:prstGeom prst="rect">
-            <a:avLst/>
-          </a:prstGeom>
-        </p:spPr>
-      </p:pic>
-    </p:spTree>
-    <p:extLst>
-      <p:ext uri="{BB962C8B-B14F-4D97-AF65-F5344CB8AC3E}">
-        <p14:creationId xmlns:p14="http://schemas.microsoft.com/office/powerpoint/2010/main" val="4063721181"/>
-      </p:ext>
-    </p:extLst>
-  </p:cSld>
-  <p:clrMapOvr>
-    <a:masterClrMapping/>
-  </p:clrMapOvr>
-</p:sld>
-</file>
-
-<file path=ppt/slides/slide6.xml><?xml version="1.0" encoding="utf-8"?>
-<p:sld xmlns:a="http://schemas.openxmlformats.org/drawingml/2006/main" xmlns:r="http://schemas.openxmlformats.org/officeDocument/2006/relationships" xmlns:p="http://schemas.openxmlformats.org/presentationml/2006/main">
-  <p:cSld>
-    <p:bg>
-      <p:bgPr>
-        <a:blipFill dpi="0" rotWithShape="1">
-          <a:blip r:embed="rId2">
-            <a:lum/>
-          </a:blip>
-          <a:srcRect/>
-          <a:stretch>
-            <a:fillRect/>
-          </a:stretch>
-        </a:blipFill>
-        <a:effectLst/>
-      </p:bgPr>
-    </p:bg>
-    <p:spTree>
-      <p:nvGrpSpPr>
-        <p:cNvPr id="1" name=""/>
-        <p:cNvGrpSpPr/>
-        <p:nvPr/>
-      </p:nvGrpSpPr>
-      <p:grpSpPr>
-        <a:xfrm>
-          <a:off x="0" y="0"/>
-          <a:ext cx="0" cy="0"/>
-          <a:chOff x="0" y="0"/>
-          <a:chExt cx="0" cy="0"/>
-        </a:xfrm>
-      </p:grpSpPr>
-      <p:sp>
-        <p:nvSpPr>
-          <p:cNvPr id="2" name="Título 1">
-            <a:extLst>
-              <a:ext uri="{FF2B5EF4-FFF2-40B4-BE49-F238E27FC236}">
-                <a16:creationId xmlns:a16="http://schemas.microsoft.com/office/drawing/2014/main" id="{CFB490EC-9EFA-41A1-AD47-69164ED0A8CE}"/>
-              </a:ext>
-            </a:extLst>
-          </p:cNvPr>
-          <p:cNvSpPr>
-            <a:spLocks noGrp="1"/>
-          </p:cNvSpPr>
-          <p:nvPr>
-            <p:ph type="title"/>
-          </p:nvPr>
-        </p:nvSpPr>
-        <p:spPr/>
-        <p:txBody>
-          <a:bodyPr/>
-          <a:lstStyle/>
-          <a:p>
-            <a:r>
-              <a:rPr lang="es-ES" dirty="0">
-                <a:solidFill>
-                  <a:schemeClr val="accent2">
-                    <a:lumMod val="75000"/>
-                  </a:schemeClr>
-                </a:solidFill>
-              </a:rPr>
-              <a:t>Demo Time</a:t>
-            </a:r>
-          </a:p>
-        </p:txBody>
-      </p:sp>
-      <p:sp>
-        <p:nvSpPr>
-          <p:cNvPr id="3" name="Marcador de contenido 2">
-            <a:extLst>
-              <a:ext uri="{FF2B5EF4-FFF2-40B4-BE49-F238E27FC236}">
-                <a16:creationId xmlns:a16="http://schemas.microsoft.com/office/drawing/2014/main" id="{3144CED1-1753-4393-B9FA-079BD36E3AEF}"/>
-              </a:ext>
-            </a:extLst>
-          </p:cNvPr>
-          <p:cNvSpPr>
-            <a:spLocks noGrp="1"/>
-          </p:cNvSpPr>
-          <p:nvPr>
-            <p:ph idx="1"/>
-          </p:nvPr>
-        </p:nvSpPr>
-        <p:spPr/>
-        <p:txBody>
-          <a:bodyPr/>
-          <a:lstStyle/>
-          <a:p>
-            <a:endParaRPr lang="es-ES"/>
-          </a:p>
-        </p:txBody>
-      </p:sp>
-    </p:spTree>
-    <p:extLst>
-      <p:ext uri="{BB962C8B-B14F-4D97-AF65-F5344CB8AC3E}">
-        <p14:creationId xmlns:p14="http://schemas.microsoft.com/office/powerpoint/2010/main" val="3885114006"/>
-      </p:ext>
-    </p:extLst>
-  </p:cSld>
-  <p:clrMapOvr>
-    <a:masterClrMapping/>
-  </p:clrMapOvr>
-</p:sld>
-</file>
-
-<file path=ppt/slides/slide7.xml><?xml version="1.0" encoding="utf-8"?>
+<file path=ppt/slides/slide12.xml><?xml version="1.0" encoding="utf-8"?>
 <p:sld xmlns:a="http://schemas.openxmlformats.org/drawingml/2006/main" xmlns:r="http://schemas.openxmlformats.org/officeDocument/2006/relationships" xmlns:p="http://schemas.openxmlformats.org/presentationml/2006/main">
   <p:cSld>
     <p:bg>
@@ -6692,10 +6288,10 @@
           <p:cNvPr id="15" name="Rectangle 14">
             <a:extLst>
               <a:ext uri="{FF2B5EF4-FFF2-40B4-BE49-F238E27FC236}">
-                <a16:creationId xmlns:a16="http://schemas.microsoft.com/office/drawing/2014/main" id="{A65AC7D1-EAA9-48F5-B509-60A7F50BF703}"/>
+                <a16:creationId xmlns:a16="http://schemas.microsoft.com/office/drawing/2014/main" xmlns="" id="{A65AC7D1-EAA9-48F5-B509-60A7F50BF703}"/>
               </a:ext>
               <a:ext uri="{C183D7F6-B498-43B3-948B-1728B52AA6E4}">
-                <adec:decorative xmlns:adec="http://schemas.microsoft.com/office/drawing/2017/decorative" val="1"/>
+                <adec:decorative xmlns:adec="http://schemas.microsoft.com/office/drawing/2017/decorative" xmlns="" val="1"/>
               </a:ext>
             </a:extLst>
           </p:cNvPr>
@@ -6752,10 +6348,10 @@
           <p:cNvPr id="17" name="Rectangle 16">
             <a:extLst>
               <a:ext uri="{FF2B5EF4-FFF2-40B4-BE49-F238E27FC236}">
-                <a16:creationId xmlns:a16="http://schemas.microsoft.com/office/drawing/2014/main" id="{D6320AF9-619A-4175-865B-5663E1AEF4C5}"/>
+                <a16:creationId xmlns:a16="http://schemas.microsoft.com/office/drawing/2014/main" xmlns="" id="{D6320AF9-619A-4175-865B-5663E1AEF4C5}"/>
               </a:ext>
               <a:ext uri="{C183D7F6-B498-43B3-948B-1728B52AA6E4}">
-                <adec:decorative xmlns:adec="http://schemas.microsoft.com/office/drawing/2017/decorative" val="1"/>
+                <adec:decorative xmlns:adec="http://schemas.microsoft.com/office/drawing/2017/decorative" xmlns="" val="1"/>
               </a:ext>
             </a:extLst>
           </p:cNvPr>
@@ -6812,10 +6408,10 @@
           <p:cNvPr id="19" name="Straight Connector 18">
             <a:extLst>
               <a:ext uri="{FF2B5EF4-FFF2-40B4-BE49-F238E27FC236}">
-                <a16:creationId xmlns:a16="http://schemas.microsoft.com/office/drawing/2014/main" id="{063B6EC6-D752-4EE7-908B-F8F19E8C7FEA}"/>
+                <a16:creationId xmlns:a16="http://schemas.microsoft.com/office/drawing/2014/main" xmlns="" id="{063B6EC6-D752-4EE7-908B-F8F19E8C7FEA}"/>
               </a:ext>
               <a:ext uri="{C183D7F6-B498-43B3-948B-1728B52AA6E4}">
-                <adec:decorative xmlns:adec="http://schemas.microsoft.com/office/drawing/2017/decorative" val="1"/>
+                <adec:decorative xmlns:adec="http://schemas.microsoft.com/office/drawing/2017/decorative" xmlns="" val="1"/>
               </a:ext>
             </a:extLst>
           </p:cNvPr>
@@ -6866,10 +6462,10 @@
           <p:cNvPr id="21" name="Straight Connector 20">
             <a:extLst>
               <a:ext uri="{FF2B5EF4-FFF2-40B4-BE49-F238E27FC236}">
-                <a16:creationId xmlns:a16="http://schemas.microsoft.com/office/drawing/2014/main" id="{EFECD4E8-AD3E-4228-82A2-9461958EA94D}"/>
+                <a16:creationId xmlns:a16="http://schemas.microsoft.com/office/drawing/2014/main" xmlns="" id="{EFECD4E8-AD3E-4228-82A2-9461958EA94D}"/>
               </a:ext>
               <a:ext uri="{C183D7F6-B498-43B3-948B-1728B52AA6E4}">
-                <adec:decorative xmlns:adec="http://schemas.microsoft.com/office/drawing/2017/decorative" val="1"/>
+                <adec:decorative xmlns:adec="http://schemas.microsoft.com/office/drawing/2017/decorative" xmlns="" val="1"/>
               </a:ext>
             </a:extLst>
           </p:cNvPr>
@@ -6922,10 +6518,10 @@
           <p:cNvPr id="23" name="Rectangle 23">
             <a:extLst>
               <a:ext uri="{FF2B5EF4-FFF2-40B4-BE49-F238E27FC236}">
-                <a16:creationId xmlns:a16="http://schemas.microsoft.com/office/drawing/2014/main" id="{7E018740-5C2B-4A41-AC1A-7E68D1EC1954}"/>
+                <a16:creationId xmlns:a16="http://schemas.microsoft.com/office/drawing/2014/main" xmlns="" id="{7E018740-5C2B-4A41-AC1A-7E68D1EC1954}"/>
               </a:ext>
               <a:ext uri="{C183D7F6-B498-43B3-948B-1728B52AA6E4}">
-                <adec:decorative xmlns:adec="http://schemas.microsoft.com/office/drawing/2017/decorative" val="1"/>
+                <adec:decorative xmlns:adec="http://schemas.microsoft.com/office/drawing/2017/decorative" xmlns="" val="1"/>
               </a:ext>
             </a:extLst>
           </p:cNvPr>
@@ -7002,10 +6598,10 @@
           <p:cNvPr id="25" name="Rectangle 25">
             <a:extLst>
               <a:ext uri="{FF2B5EF4-FFF2-40B4-BE49-F238E27FC236}">
-                <a16:creationId xmlns:a16="http://schemas.microsoft.com/office/drawing/2014/main" id="{166F75A4-C475-4941-8EE2-B80A06A2C1BB}"/>
+                <a16:creationId xmlns:a16="http://schemas.microsoft.com/office/drawing/2014/main" xmlns="" id="{166F75A4-C475-4941-8EE2-B80A06A2C1BB}"/>
               </a:ext>
               <a:ext uri="{C183D7F6-B498-43B3-948B-1728B52AA6E4}">
-                <adec:decorative xmlns:adec="http://schemas.microsoft.com/office/drawing/2017/decorative" val="1"/>
+                <adec:decorative xmlns:adec="http://schemas.microsoft.com/office/drawing/2017/decorative" xmlns="" val="1"/>
               </a:ext>
             </a:extLst>
           </p:cNvPr>
@@ -7082,10 +6678,10 @@
           <p:cNvPr id="27" name="Isosceles Triangle 26">
             <a:extLst>
               <a:ext uri="{FF2B5EF4-FFF2-40B4-BE49-F238E27FC236}">
-                <a16:creationId xmlns:a16="http://schemas.microsoft.com/office/drawing/2014/main" id="{A032553A-72E8-4B0D-8405-FF9771C9AF05}"/>
+                <a16:creationId xmlns:a16="http://schemas.microsoft.com/office/drawing/2014/main" xmlns="" id="{A032553A-72E8-4B0D-8405-FF9771C9AF05}"/>
               </a:ext>
               <a:ext uri="{C183D7F6-B498-43B3-948B-1728B52AA6E4}">
-                <adec:decorative xmlns:adec="http://schemas.microsoft.com/office/drawing/2017/decorative" val="1"/>
+                <adec:decorative xmlns:adec="http://schemas.microsoft.com/office/drawing/2017/decorative" xmlns="" val="1"/>
               </a:ext>
             </a:extLst>
           </p:cNvPr>
@@ -7140,10 +6736,10 @@
           <p:cNvPr id="29" name="Rectangle 27">
             <a:extLst>
               <a:ext uri="{FF2B5EF4-FFF2-40B4-BE49-F238E27FC236}">
-                <a16:creationId xmlns:a16="http://schemas.microsoft.com/office/drawing/2014/main" id="{765800AC-C3B9-498E-87BC-29FAE4C76B21}"/>
+                <a16:creationId xmlns:a16="http://schemas.microsoft.com/office/drawing/2014/main" xmlns="" id="{765800AC-C3B9-498E-87BC-29FAE4C76B21}"/>
               </a:ext>
               <a:ext uri="{C183D7F6-B498-43B3-948B-1728B52AA6E4}">
-                <adec:decorative xmlns:adec="http://schemas.microsoft.com/office/drawing/2017/decorative" val="1"/>
+                <adec:decorative xmlns:adec="http://schemas.microsoft.com/office/drawing/2017/decorative" xmlns="" val="1"/>
               </a:ext>
             </a:extLst>
           </p:cNvPr>
@@ -7221,10 +6817,10 @@
           <p:cNvPr id="31" name="Isosceles Triangle 30">
             <a:extLst>
               <a:ext uri="{FF2B5EF4-FFF2-40B4-BE49-F238E27FC236}">
-                <a16:creationId xmlns:a16="http://schemas.microsoft.com/office/drawing/2014/main" id="{1F9D6ACB-2FF4-49F9-978A-E0D5327FC635}"/>
+                <a16:creationId xmlns:a16="http://schemas.microsoft.com/office/drawing/2014/main" xmlns="" id="{1F9D6ACB-2FF4-49F9-978A-E0D5327FC635}"/>
               </a:ext>
               <a:ext uri="{C183D7F6-B498-43B3-948B-1728B52AA6E4}">
-                <adec:decorative xmlns:adec="http://schemas.microsoft.com/office/drawing/2017/decorative" val="1"/>
+                <adec:decorative xmlns:adec="http://schemas.microsoft.com/office/drawing/2017/decorative" xmlns="" val="1"/>
               </a:ext>
             </a:extLst>
           </p:cNvPr>
@@ -7279,10 +6875,10 @@
           <p:cNvPr id="33" name="Freeform: Shape 32">
             <a:extLst>
               <a:ext uri="{FF2B5EF4-FFF2-40B4-BE49-F238E27FC236}">
-                <a16:creationId xmlns:a16="http://schemas.microsoft.com/office/drawing/2014/main" id="{A5EC319D-0FEA-4B95-A3EA-01E35672C95B}"/>
+                <a16:creationId xmlns:a16="http://schemas.microsoft.com/office/drawing/2014/main" xmlns="" id="{A5EC319D-0FEA-4B95-A3EA-01E35672C95B}"/>
               </a:ext>
               <a:ext uri="{C183D7F6-B498-43B3-948B-1728B52AA6E4}">
-                <adec:decorative xmlns:adec="http://schemas.microsoft.com/office/drawing/2017/decorative" val="1"/>
+                <adec:decorative xmlns:adec="http://schemas.microsoft.com/office/drawing/2017/decorative" xmlns="" val="1"/>
               </a:ext>
             </a:extLst>
           </p:cNvPr>
@@ -7406,75 +7002,75 @@
           </a:p>
         </p:txBody>
       </p:sp>
-      <p:pic>
-        <p:nvPicPr>
-          <p:cNvPr id="10" name="Marcador de contenido 6">
+      <p:sp>
+        <p:nvSpPr>
+          <p:cNvPr id="2" name="Título 1">
             <a:extLst>
               <a:ext uri="{FF2B5EF4-FFF2-40B4-BE49-F238E27FC236}">
-                <a16:creationId xmlns:a16="http://schemas.microsoft.com/office/drawing/2014/main" id="{2F09CA93-E3E8-4116-B412-3B48337FB307}"/>
+                <a16:creationId xmlns:a16="http://schemas.microsoft.com/office/drawing/2014/main" xmlns="" id="{6CE925F6-2C94-4D9B-9EAC-9F7430DE48BF}"/>
               </a:ext>
             </a:extLst>
           </p:cNvPr>
+          <p:cNvSpPr>
+            <a:spLocks noGrp="1"/>
+          </p:cNvSpPr>
+          <p:nvPr>
+            <p:ph type="title"/>
+          </p:nvPr>
+        </p:nvSpPr>
+        <p:spPr>
+          <a:xfrm>
+            <a:off x="7181723" y="609600"/>
+            <a:ext cx="4512989" cy="2227730"/>
+          </a:xfrm>
+        </p:spPr>
+        <p:txBody>
+          <a:bodyPr anchor="ctr">
+            <a:normAutofit/>
+          </a:bodyPr>
+          <a:lstStyle/>
+          <a:p>
+            <a:r>
+              <a:rPr lang="es-ES">
+                <a:solidFill>
+                  <a:srgbClr val="FFFFFF"/>
+                </a:solidFill>
+              </a:rPr>
+              <a:t>¿Alguna pregunta?</a:t>
+            </a:r>
+          </a:p>
+        </p:txBody>
+      </p:sp>
+      <p:pic>
+        <p:nvPicPr>
+          <p:cNvPr id="3" name="Imagen 2"/>
           <p:cNvPicPr>
             <a:picLocks noChangeAspect="1"/>
           </p:cNvPicPr>
           <p:nvPr/>
         </p:nvPicPr>
         <p:blipFill>
-          <a:blip r:embed="rId3"/>
+          <a:blip r:embed="rId3">
+            <a:extLst>
+              <a:ext uri="{28A0092B-C50C-407E-A947-70E740481C1C}">
+                <a14:useLocalDpi xmlns:a14="http://schemas.microsoft.com/office/drawing/2010/main" val="0"/>
+              </a:ext>
+            </a:extLst>
+          </a:blip>
           <a:stretch>
             <a:fillRect/>
           </a:stretch>
         </p:blipFill>
         <p:spPr>
           <a:xfrm>
-            <a:off x="7758859" y="2181714"/>
-            <a:ext cx="3259501" cy="4610101"/>
+            <a:off x="6951551" y="1032806"/>
+            <a:ext cx="4090864" cy="5785945"/>
           </a:xfrm>
           <a:prstGeom prst="rect">
             <a:avLst/>
           </a:prstGeom>
         </p:spPr>
       </p:pic>
-      <p:sp>
-        <p:nvSpPr>
-          <p:cNvPr id="2" name="Título 1">
-            <a:extLst>
-              <a:ext uri="{FF2B5EF4-FFF2-40B4-BE49-F238E27FC236}">
-                <a16:creationId xmlns:a16="http://schemas.microsoft.com/office/drawing/2014/main" id="{6CE925F6-2C94-4D9B-9EAC-9F7430DE48BF}"/>
-              </a:ext>
-            </a:extLst>
-          </p:cNvPr>
-          <p:cNvSpPr>
-            <a:spLocks noGrp="1"/>
-          </p:cNvSpPr>
-          <p:nvPr>
-            <p:ph type="title"/>
-          </p:nvPr>
-        </p:nvSpPr>
-        <p:spPr>
-          <a:xfrm>
-            <a:off x="7181723" y="609600"/>
-            <a:ext cx="4512989" cy="2227730"/>
-          </a:xfrm>
-        </p:spPr>
-        <p:txBody>
-          <a:bodyPr anchor="ctr">
-            <a:normAutofit/>
-          </a:bodyPr>
-          <a:lstStyle/>
-          <a:p>
-            <a:r>
-              <a:rPr lang="es-ES">
-                <a:solidFill>
-                  <a:srgbClr val="FFFFFF"/>
-                </a:solidFill>
-              </a:rPr>
-              <a:t>¿Alguna pregunta?</a:t>
-            </a:r>
-          </a:p>
-        </p:txBody>
-      </p:sp>
     </p:spTree>
     <p:extLst>
       <p:ext uri="{BB962C8B-B14F-4D97-AF65-F5344CB8AC3E}">
@@ -7488,7 +7084,7 @@
 </p:sld>
 </file>
 
-<file path=ppt/slides/slide8.xml><?xml version="1.0" encoding="utf-8"?>
+<file path=ppt/slides/slide13.xml><?xml version="1.0" encoding="utf-8"?>
 <p:sld xmlns:a="http://schemas.openxmlformats.org/drawingml/2006/main" xmlns:r="http://schemas.openxmlformats.org/officeDocument/2006/relationships" xmlns:p="http://schemas.openxmlformats.org/presentationml/2006/main">
   <p:cSld>
     <p:bg>
@@ -7524,7 +7120,7 @@
           <p:cNvPr id="2" name="Título 1">
             <a:extLst>
               <a:ext uri="{FF2B5EF4-FFF2-40B4-BE49-F238E27FC236}">
-                <a16:creationId xmlns:a16="http://schemas.microsoft.com/office/drawing/2014/main" id="{FF24AF6E-1F5A-4C49-9EB1-368A3E5E88EC}"/>
+                <a16:creationId xmlns:a16="http://schemas.microsoft.com/office/drawing/2014/main" xmlns="" id="{FF24AF6E-1F5A-4C49-9EB1-368A3E5E88EC}"/>
               </a:ext>
             </a:extLst>
           </p:cNvPr>
@@ -7561,7 +7157,7 @@
           <p:cNvPr id="5" name="Título 1">
             <a:extLst>
               <a:ext uri="{FF2B5EF4-FFF2-40B4-BE49-F238E27FC236}">
-                <a16:creationId xmlns:a16="http://schemas.microsoft.com/office/drawing/2014/main" id="{E17CCA9B-9543-4232-AF49-C727FCA162BD}"/>
+                <a16:creationId xmlns:a16="http://schemas.microsoft.com/office/drawing/2014/main" xmlns="" id="{E17CCA9B-9543-4232-AF49-C727FCA162BD}"/>
               </a:ext>
             </a:extLst>
           </p:cNvPr>
@@ -7668,7 +7264,7 @@
           <p:cNvPr id="6" name="Título 1">
             <a:extLst>
               <a:ext uri="{FF2B5EF4-FFF2-40B4-BE49-F238E27FC236}">
-                <a16:creationId xmlns:a16="http://schemas.microsoft.com/office/drawing/2014/main" id="{F549949C-258A-47D3-8207-C535CFA7F81E}"/>
+                <a16:creationId xmlns:a16="http://schemas.microsoft.com/office/drawing/2014/main" xmlns="" id="{F549949C-258A-47D3-8207-C535CFA7F81E}"/>
               </a:ext>
             </a:extLst>
           </p:cNvPr>
@@ -7775,7 +7371,7 @@
           <p:cNvPr id="8" name="Imagen 7" descr="Imagen que contiene texto&#10;&#10;Descripción generada con confianza alta">
             <a:extLst>
               <a:ext uri="{FF2B5EF4-FFF2-40B4-BE49-F238E27FC236}">
-                <a16:creationId xmlns:a16="http://schemas.microsoft.com/office/drawing/2014/main" id="{AAF452DB-A09B-4373-B53B-DD2E16A27191}"/>
+                <a16:creationId xmlns:a16="http://schemas.microsoft.com/office/drawing/2014/main" xmlns="" id="{AAF452DB-A09B-4373-B53B-DD2E16A27191}"/>
               </a:ext>
             </a:extLst>
           </p:cNvPr>
@@ -7805,7 +7401,7 @@
           <p:cNvPr id="10" name="Imagen 9">
             <a:extLst>
               <a:ext uri="{FF2B5EF4-FFF2-40B4-BE49-F238E27FC236}">
-                <a16:creationId xmlns:a16="http://schemas.microsoft.com/office/drawing/2014/main" id="{D8BD8AC2-6646-4056-B9BF-3E219687D519}"/>
+                <a16:creationId xmlns:a16="http://schemas.microsoft.com/office/drawing/2014/main" xmlns="" id="{D8BD8AC2-6646-4056-B9BF-3E219687D519}"/>
               </a:ext>
             </a:extLst>
           </p:cNvPr>
@@ -7835,7 +7431,7 @@
           <p:cNvPr id="12" name="Imagen 11">
             <a:extLst>
               <a:ext uri="{FF2B5EF4-FFF2-40B4-BE49-F238E27FC236}">
-                <a16:creationId xmlns:a16="http://schemas.microsoft.com/office/drawing/2014/main" id="{6EDCE439-7E40-4E16-873B-9ABB948F7D7A}"/>
+                <a16:creationId xmlns:a16="http://schemas.microsoft.com/office/drawing/2014/main" xmlns="" id="{6EDCE439-7E40-4E16-873B-9ABB948F7D7A}"/>
               </a:ext>
             </a:extLst>
           </p:cNvPr>
@@ -7865,7 +7461,7 @@
           <p:cNvPr id="14" name="Imagen 13">
             <a:extLst>
               <a:ext uri="{FF2B5EF4-FFF2-40B4-BE49-F238E27FC236}">
-                <a16:creationId xmlns:a16="http://schemas.microsoft.com/office/drawing/2014/main" id="{D66801EC-44EA-42D2-995C-06367EBB998F}"/>
+                <a16:creationId xmlns:a16="http://schemas.microsoft.com/office/drawing/2014/main" xmlns="" id="{D66801EC-44EA-42D2-995C-06367EBB998F}"/>
               </a:ext>
             </a:extLst>
           </p:cNvPr>
@@ -7894,6 +7490,1283 @@
     <p:extLst>
       <p:ext uri="{BB962C8B-B14F-4D97-AF65-F5344CB8AC3E}">
         <p14:creationId xmlns:p14="http://schemas.microsoft.com/office/powerpoint/2010/main" val="194788618"/>
+      </p:ext>
+    </p:extLst>
+  </p:cSld>
+  <p:clrMapOvr>
+    <a:masterClrMapping/>
+  </p:clrMapOvr>
+</p:sld>
+</file>
+
+<file path=ppt/slides/slide2.xml><?xml version="1.0" encoding="utf-8"?>
+<p:sld xmlns:a="http://schemas.openxmlformats.org/drawingml/2006/main" xmlns:r="http://schemas.openxmlformats.org/officeDocument/2006/relationships" xmlns:p="http://schemas.openxmlformats.org/presentationml/2006/main">
+  <p:cSld>
+    <p:bg>
+      <p:bgPr>
+        <a:blipFill dpi="0" rotWithShape="1">
+          <a:blip r:embed="rId2">
+            <a:lum/>
+          </a:blip>
+          <a:srcRect/>
+          <a:stretch>
+            <a:fillRect t="-6000" b="-6000"/>
+          </a:stretch>
+        </a:blipFill>
+        <a:effectLst/>
+      </p:bgPr>
+    </p:bg>
+    <p:spTree>
+      <p:nvGrpSpPr>
+        <p:cNvPr id="1" name=""/>
+        <p:cNvGrpSpPr/>
+        <p:nvPr/>
+      </p:nvGrpSpPr>
+      <p:grpSpPr>
+        <a:xfrm>
+          <a:off x="0" y="0"/>
+          <a:ext cx="0" cy="0"/>
+          <a:chOff x="0" y="0"/>
+          <a:chExt cx="0" cy="0"/>
+        </a:xfrm>
+      </p:grpSpPr>
+      <p:sp>
+        <p:nvSpPr>
+          <p:cNvPr id="2" name="Título 1">
+            <a:extLst>
+              <a:ext uri="{FF2B5EF4-FFF2-40B4-BE49-F238E27FC236}">
+                <a16:creationId xmlns:a16="http://schemas.microsoft.com/office/drawing/2014/main" xmlns="" id="{6C561DC4-512B-4693-AAA6-F0784619631E}"/>
+              </a:ext>
+            </a:extLst>
+          </p:cNvPr>
+          <p:cNvSpPr>
+            <a:spLocks noGrp="1"/>
+          </p:cNvSpPr>
+          <p:nvPr>
+            <p:ph type="title"/>
+          </p:nvPr>
+        </p:nvSpPr>
+        <p:spPr/>
+        <p:txBody>
+          <a:bodyPr/>
+          <a:lstStyle/>
+          <a:p>
+            <a:r>
+              <a:rPr lang="es-ES" dirty="0"/>
+              <a:t>Índice</a:t>
+            </a:r>
+          </a:p>
+        </p:txBody>
+      </p:sp>
+      <p:sp>
+        <p:nvSpPr>
+          <p:cNvPr id="3" name="Marcador de contenido 2">
+            <a:extLst>
+              <a:ext uri="{FF2B5EF4-FFF2-40B4-BE49-F238E27FC236}">
+                <a16:creationId xmlns:a16="http://schemas.microsoft.com/office/drawing/2014/main" xmlns="" id="{94529F7B-DC78-4DEE-9A07-E09F4DFF9ACE}"/>
+              </a:ext>
+            </a:extLst>
+          </p:cNvPr>
+          <p:cNvSpPr>
+            <a:spLocks noGrp="1"/>
+          </p:cNvSpPr>
+          <p:nvPr>
+            <p:ph idx="1"/>
+          </p:nvPr>
+        </p:nvSpPr>
+        <p:spPr/>
+        <p:txBody>
+          <a:bodyPr/>
+          <a:lstStyle/>
+          <a:p>
+            <a:pPr>
+              <a:buFont typeface="+mj-lt"/>
+              <a:buAutoNum type="arabicPeriod"/>
+            </a:pPr>
+            <a:r>
+              <a:rPr lang="es-ES" dirty="0">
+                <a:solidFill>
+                  <a:schemeClr val="bg1"/>
+                </a:solidFill>
+              </a:rPr>
+              <a:t>Idea y objetivos</a:t>
+            </a:r>
+          </a:p>
+          <a:p>
+            <a:pPr>
+              <a:buFont typeface="+mj-lt"/>
+              <a:buAutoNum type="arabicPeriod"/>
+            </a:pPr>
+            <a:r>
+              <a:rPr lang="es-ES" dirty="0">
+                <a:solidFill>
+                  <a:schemeClr val="bg1"/>
+                </a:solidFill>
+              </a:rPr>
+              <a:t>Casos de uso</a:t>
+            </a:r>
+          </a:p>
+          <a:p>
+            <a:pPr>
+              <a:buFont typeface="+mj-lt"/>
+              <a:buAutoNum type="arabicPeriod"/>
+            </a:pPr>
+            <a:r>
+              <a:rPr lang="es-ES" dirty="0">
+                <a:solidFill>
+                  <a:schemeClr val="bg1"/>
+                </a:solidFill>
+              </a:rPr>
+              <a:t>Diagramas de clase</a:t>
+            </a:r>
+          </a:p>
+          <a:p>
+            <a:pPr>
+              <a:buFont typeface="+mj-lt"/>
+              <a:buAutoNum type="arabicPeriod"/>
+            </a:pPr>
+            <a:r>
+              <a:rPr lang="es-ES" dirty="0">
+                <a:solidFill>
+                  <a:schemeClr val="bg1"/>
+                </a:solidFill>
+              </a:rPr>
+              <a:t>Demo time</a:t>
+            </a:r>
+          </a:p>
+          <a:p>
+            <a:pPr>
+              <a:buFont typeface="+mj-lt"/>
+              <a:buAutoNum type="arabicPeriod"/>
+            </a:pPr>
+            <a:r>
+              <a:rPr lang="es-ES" dirty="0">
+                <a:solidFill>
+                  <a:schemeClr val="bg1"/>
+                </a:solidFill>
+              </a:rPr>
+              <a:t>Conclusiones</a:t>
+            </a:r>
+          </a:p>
+          <a:p>
+            <a:pPr>
+              <a:buFont typeface="+mj-lt"/>
+              <a:buAutoNum type="arabicPeriod"/>
+            </a:pPr>
+            <a:r>
+              <a:rPr lang="es-ES" dirty="0">
+                <a:solidFill>
+                  <a:schemeClr val="bg1"/>
+                </a:solidFill>
+              </a:rPr>
+              <a:t>Viva </a:t>
+            </a:r>
+            <a:r>
+              <a:rPr lang="es-ES" dirty="0" err="1">
+                <a:solidFill>
+                  <a:schemeClr val="bg1"/>
+                </a:solidFill>
+              </a:rPr>
+              <a:t>españa</a:t>
+            </a:r>
+            <a:endParaRPr lang="es-ES" dirty="0">
+              <a:solidFill>
+                <a:schemeClr val="bg1"/>
+              </a:solidFill>
+            </a:endParaRPr>
+          </a:p>
+        </p:txBody>
+      </p:sp>
+    </p:spTree>
+    <p:extLst>
+      <p:ext uri="{BB962C8B-B14F-4D97-AF65-F5344CB8AC3E}">
+        <p14:creationId xmlns:p14="http://schemas.microsoft.com/office/powerpoint/2010/main" val="2690464259"/>
+      </p:ext>
+    </p:extLst>
+  </p:cSld>
+  <p:clrMapOvr>
+    <a:masterClrMapping/>
+  </p:clrMapOvr>
+</p:sld>
+</file>
+
+<file path=ppt/slides/slide3.xml><?xml version="1.0" encoding="utf-8"?>
+<p:sld xmlns:a="http://schemas.openxmlformats.org/drawingml/2006/main" xmlns:r="http://schemas.openxmlformats.org/officeDocument/2006/relationships" xmlns:p="http://schemas.openxmlformats.org/presentationml/2006/main">
+  <p:cSld>
+    <p:bg>
+      <p:bgPr>
+        <a:blipFill dpi="0" rotWithShape="1">
+          <a:blip r:embed="rId2">
+            <a:lum/>
+          </a:blip>
+          <a:srcRect/>
+          <a:stretch>
+            <a:fillRect/>
+          </a:stretch>
+        </a:blipFill>
+        <a:effectLst/>
+      </p:bgPr>
+    </p:bg>
+    <p:spTree>
+      <p:nvGrpSpPr>
+        <p:cNvPr id="1" name=""/>
+        <p:cNvGrpSpPr/>
+        <p:nvPr/>
+      </p:nvGrpSpPr>
+      <p:grpSpPr>
+        <a:xfrm>
+          <a:off x="0" y="0"/>
+          <a:ext cx="0" cy="0"/>
+          <a:chOff x="0" y="0"/>
+          <a:chExt cx="0" cy="0"/>
+        </a:xfrm>
+      </p:grpSpPr>
+      <p:sp>
+        <p:nvSpPr>
+          <p:cNvPr id="2" name="Título 1">
+            <a:extLst>
+              <a:ext uri="{FF2B5EF4-FFF2-40B4-BE49-F238E27FC236}">
+                <a16:creationId xmlns:a16="http://schemas.microsoft.com/office/drawing/2014/main" xmlns="" id="{6C561DC4-512B-4693-AAA6-F0784619631E}"/>
+              </a:ext>
+            </a:extLst>
+          </p:cNvPr>
+          <p:cNvSpPr>
+            <a:spLocks noGrp="1"/>
+          </p:cNvSpPr>
+          <p:nvPr>
+            <p:ph type="title"/>
+          </p:nvPr>
+        </p:nvSpPr>
+        <p:spPr>
+          <a:xfrm>
+            <a:off x="408051" y="184826"/>
+            <a:ext cx="8596668" cy="1320800"/>
+          </a:xfrm>
+        </p:spPr>
+        <p:txBody>
+          <a:bodyPr/>
+          <a:lstStyle/>
+          <a:p>
+            <a:r>
+              <a:rPr lang="es-ES" dirty="0">
+                <a:solidFill>
+                  <a:schemeClr val="accent2">
+                    <a:lumMod val="75000"/>
+                  </a:schemeClr>
+                </a:solidFill>
+              </a:rPr>
+              <a:t>¿Quiénes somos?</a:t>
+            </a:r>
+          </a:p>
+        </p:txBody>
+      </p:sp>
+      <p:sp>
+        <p:nvSpPr>
+          <p:cNvPr id="3" name="Marcador de contenido 2">
+            <a:extLst>
+              <a:ext uri="{FF2B5EF4-FFF2-40B4-BE49-F238E27FC236}">
+                <a16:creationId xmlns:a16="http://schemas.microsoft.com/office/drawing/2014/main" xmlns="" id="{94529F7B-DC78-4DEE-9A07-E09F4DFF9ACE}"/>
+              </a:ext>
+            </a:extLst>
+          </p:cNvPr>
+          <p:cNvSpPr>
+            <a:spLocks noGrp="1"/>
+          </p:cNvSpPr>
+          <p:nvPr>
+            <p:ph idx="1"/>
+          </p:nvPr>
+        </p:nvSpPr>
+        <p:spPr>
+          <a:xfrm>
+            <a:off x="122857" y="1031132"/>
+            <a:ext cx="9167057" cy="4562758"/>
+          </a:xfrm>
+        </p:spPr>
+        <p:txBody>
+          <a:bodyPr/>
+          <a:lstStyle/>
+          <a:p>
+            <a:r>
+              <a:rPr lang="es-ES" dirty="0" err="1">
+                <a:solidFill>
+                  <a:schemeClr val="accent2">
+                    <a:lumMod val="75000"/>
+                  </a:schemeClr>
+                </a:solidFill>
+              </a:rPr>
+              <a:t>StartUP</a:t>
+            </a:r>
+            <a:r>
+              <a:rPr lang="es-ES" dirty="0">
+                <a:solidFill>
+                  <a:schemeClr val="accent2">
+                    <a:lumMod val="75000"/>
+                  </a:schemeClr>
+                </a:solidFill>
+              </a:rPr>
+              <a:t> formada por 7 estudiantes de Ingeniería de </a:t>
+            </a:r>
+            <a:r>
+              <a:rPr lang="es-ES" dirty="0" smtClean="0">
+                <a:solidFill>
+                  <a:schemeClr val="accent2">
+                    <a:lumMod val="75000"/>
+                  </a:schemeClr>
+                </a:solidFill>
+              </a:rPr>
+              <a:t>Software.</a:t>
+            </a:r>
+            <a:endParaRPr lang="es-ES" dirty="0">
+              <a:solidFill>
+                <a:schemeClr val="accent2">
+                  <a:lumMod val="75000"/>
+                </a:schemeClr>
+              </a:solidFill>
+            </a:endParaRPr>
+          </a:p>
+          <a:p>
+            <a:r>
+              <a:rPr lang="es-ES" dirty="0">
+                <a:solidFill>
+                  <a:schemeClr val="accent2">
+                    <a:lumMod val="75000"/>
+                  </a:schemeClr>
+                </a:solidFill>
+              </a:rPr>
+              <a:t>Nuestra idea: Aplicación enfocada a la mejora y mantenimiento de las </a:t>
+            </a:r>
+            <a:r>
+              <a:rPr lang="es-ES" dirty="0" smtClean="0">
+                <a:solidFill>
+                  <a:schemeClr val="accent2">
+                    <a:lumMod val="75000"/>
+                  </a:schemeClr>
+                </a:solidFill>
+              </a:rPr>
+              <a:t>ciudades.</a:t>
+            </a:r>
+            <a:endParaRPr lang="es-ES" dirty="0">
+              <a:solidFill>
+                <a:schemeClr val="accent2">
+                  <a:lumMod val="75000"/>
+                </a:schemeClr>
+              </a:solidFill>
+            </a:endParaRPr>
+          </a:p>
+          <a:p>
+            <a:r>
+              <a:rPr lang="es-ES" dirty="0">
+                <a:solidFill>
+                  <a:schemeClr val="accent2">
+                    <a:lumMod val="75000"/>
+                  </a:schemeClr>
+                </a:solidFill>
+              </a:rPr>
+              <a:t>Nuestra </a:t>
+            </a:r>
+            <a:r>
+              <a:rPr lang="es-ES" dirty="0" smtClean="0">
+                <a:solidFill>
+                  <a:schemeClr val="accent2">
+                    <a:lumMod val="75000"/>
+                  </a:schemeClr>
+                </a:solidFill>
+              </a:rPr>
+              <a:t>motivación: La necesidad </a:t>
+            </a:r>
+            <a:r>
+              <a:rPr lang="es-ES" dirty="0">
+                <a:solidFill>
+                  <a:schemeClr val="accent2">
+                    <a:lumMod val="75000"/>
+                  </a:schemeClr>
+                </a:solidFill>
+              </a:rPr>
+              <a:t>de infraestructura o cambios en las ciudades y la forma de manejar esta información entre Ciudadanos y Ayuntamiento.</a:t>
+            </a:r>
+          </a:p>
+          <a:p>
+            <a:r>
+              <a:rPr lang="es-ES" dirty="0">
+                <a:solidFill>
+                  <a:schemeClr val="accent2">
+                    <a:lumMod val="75000"/>
+                  </a:schemeClr>
+                </a:solidFill>
+              </a:rPr>
+              <a:t>Nuestro objetivo: Crear una plataforma en la que los usuarios pueden aportar ideas para mejorar la ciudad donde residen. Apoyando las que son más relevantes con sus firmas.</a:t>
+            </a:r>
+          </a:p>
+        </p:txBody>
+      </p:sp>
+    </p:spTree>
+    <p:extLst>
+      <p:ext uri="{BB962C8B-B14F-4D97-AF65-F5344CB8AC3E}">
+        <p14:creationId xmlns:p14="http://schemas.microsoft.com/office/powerpoint/2010/main" val="396919000"/>
+      </p:ext>
+    </p:extLst>
+  </p:cSld>
+  <p:clrMapOvr>
+    <a:masterClrMapping/>
+  </p:clrMapOvr>
+</p:sld>
+</file>
+
+<file path=ppt/slides/slide4.xml><?xml version="1.0" encoding="utf-8"?>
+<p:sld xmlns:a="http://schemas.openxmlformats.org/drawingml/2006/main" xmlns:r="http://schemas.openxmlformats.org/officeDocument/2006/relationships" xmlns:p="http://schemas.openxmlformats.org/presentationml/2006/main">
+  <p:cSld>
+    <p:bg>
+      <p:bgPr>
+        <a:blipFill dpi="0" rotWithShape="1">
+          <a:blip r:embed="rId2">
+            <a:lum/>
+          </a:blip>
+          <a:srcRect/>
+          <a:stretch>
+            <a:fillRect/>
+          </a:stretch>
+        </a:blipFill>
+        <a:effectLst/>
+      </p:bgPr>
+    </p:bg>
+    <p:spTree>
+      <p:nvGrpSpPr>
+        <p:cNvPr id="1" name=""/>
+        <p:cNvGrpSpPr/>
+        <p:nvPr/>
+      </p:nvGrpSpPr>
+      <p:grpSpPr>
+        <a:xfrm>
+          <a:off x="0" y="0"/>
+          <a:ext cx="0" cy="0"/>
+          <a:chOff x="0" y="0"/>
+          <a:chExt cx="0" cy="0"/>
+        </a:xfrm>
+      </p:grpSpPr>
+      <p:sp>
+        <p:nvSpPr>
+          <p:cNvPr id="2" name="Título 1">
+            <a:extLst>
+              <a:ext uri="{FF2B5EF4-FFF2-40B4-BE49-F238E27FC236}">
+                <a16:creationId xmlns:a16="http://schemas.microsoft.com/office/drawing/2014/main" xmlns="" id="{90D38644-861F-49D4-961C-8125C843D401}"/>
+              </a:ext>
+            </a:extLst>
+          </p:cNvPr>
+          <p:cNvSpPr>
+            <a:spLocks noGrp="1"/>
+          </p:cNvSpPr>
+          <p:nvPr>
+            <p:ph type="title"/>
+          </p:nvPr>
+        </p:nvSpPr>
+        <p:spPr/>
+        <p:txBody>
+          <a:bodyPr/>
+          <a:lstStyle/>
+          <a:p>
+            <a:r>
+              <a:rPr lang="es-ES" dirty="0" smtClean="0">
+                <a:solidFill>
+                  <a:schemeClr val="accent2">
+                    <a:lumMod val="75000"/>
+                  </a:schemeClr>
+                </a:solidFill>
+              </a:rPr>
+              <a:t>Planificación</a:t>
+            </a:r>
+            <a:endParaRPr lang="es-ES" dirty="0">
+              <a:solidFill>
+                <a:schemeClr val="accent2">
+                  <a:lumMod val="75000"/>
+                </a:schemeClr>
+              </a:solidFill>
+            </a:endParaRPr>
+          </a:p>
+        </p:txBody>
+      </p:sp>
+      <p:pic>
+        <p:nvPicPr>
+          <p:cNvPr id="13" name="Image1"/>
+          <p:cNvPicPr/>
+          <p:nvPr/>
+        </p:nvPicPr>
+        <p:blipFill>
+          <a:blip r:embed="rId3"/>
+          <a:stretch>
+            <a:fillRect/>
+          </a:stretch>
+        </p:blipFill>
+        <p:spPr bwMode="auto">
+          <a:xfrm>
+            <a:off x="682876" y="1926897"/>
+            <a:ext cx="8591126" cy="2182648"/>
+          </a:xfrm>
+          <a:prstGeom prst="rect">
+            <a:avLst/>
+          </a:prstGeom>
+        </p:spPr>
+      </p:pic>
+      <p:sp>
+        <p:nvSpPr>
+          <p:cNvPr id="15" name="CuadroTexto 14"/>
+          <p:cNvSpPr txBox="1"/>
+          <p:nvPr/>
+        </p:nvSpPr>
+        <p:spPr>
+          <a:xfrm>
+            <a:off x="957263" y="1557565"/>
+            <a:ext cx="2438488" cy="369332"/>
+          </a:xfrm>
+          <a:prstGeom prst="rect">
+            <a:avLst/>
+          </a:prstGeom>
+          <a:noFill/>
+        </p:spPr>
+        <p:txBody>
+          <a:bodyPr wrap="none" rtlCol="0">
+            <a:spAutoFit/>
+          </a:bodyPr>
+          <a:lstStyle/>
+          <a:p>
+            <a:r>
+              <a:rPr lang="es-ES_tradnl" dirty="0" smtClean="0">
+                <a:solidFill>
+                  <a:schemeClr val="accent2"/>
+                </a:solidFill>
+              </a:rPr>
+              <a:t>Planificación general:</a:t>
+            </a:r>
+            <a:endParaRPr lang="es-ES_tradnl" dirty="0">
+              <a:solidFill>
+                <a:schemeClr val="accent2"/>
+              </a:solidFill>
+            </a:endParaRPr>
+          </a:p>
+        </p:txBody>
+      </p:sp>
+      <p:pic>
+        <p:nvPicPr>
+          <p:cNvPr id="16" name="Imagen 15"/>
+          <p:cNvPicPr>
+            <a:picLocks noChangeAspect="1"/>
+          </p:cNvPicPr>
+          <p:nvPr/>
+        </p:nvPicPr>
+        <p:blipFill>
+          <a:blip r:embed="rId4">
+            <a:extLst>
+              <a:ext uri="{28A0092B-C50C-407E-A947-70E740481C1C}">
+                <a14:useLocalDpi xmlns:a14="http://schemas.microsoft.com/office/drawing/2010/main" val="0"/>
+              </a:ext>
+            </a:extLst>
+          </a:blip>
+          <a:stretch>
+            <a:fillRect/>
+          </a:stretch>
+        </p:blipFill>
+        <p:spPr>
+          <a:xfrm>
+            <a:off x="7924799" y="3000375"/>
+            <a:ext cx="5786438" cy="3857625"/>
+          </a:xfrm>
+          <a:prstGeom prst="rect">
+            <a:avLst/>
+          </a:prstGeom>
+        </p:spPr>
+      </p:pic>
+    </p:spTree>
+    <p:extLst>
+      <p:ext uri="{BB962C8B-B14F-4D97-AF65-F5344CB8AC3E}">
+        <p14:creationId xmlns:p14="http://schemas.microsoft.com/office/powerpoint/2010/main" val="133487774"/>
+      </p:ext>
+    </p:extLst>
+  </p:cSld>
+  <p:clrMapOvr>
+    <a:masterClrMapping/>
+  </p:clrMapOvr>
+</p:sld>
+</file>
+
+<file path=ppt/slides/slide5.xml><?xml version="1.0" encoding="utf-8"?>
+<p:sld xmlns:a="http://schemas.openxmlformats.org/drawingml/2006/main" xmlns:r="http://schemas.openxmlformats.org/officeDocument/2006/relationships" xmlns:p="http://schemas.openxmlformats.org/presentationml/2006/main">
+  <p:cSld>
+    <p:bg>
+      <p:bgPr>
+        <a:blipFill dpi="0" rotWithShape="1">
+          <a:blip r:embed="rId2">
+            <a:lum/>
+          </a:blip>
+          <a:srcRect/>
+          <a:stretch>
+            <a:fillRect/>
+          </a:stretch>
+        </a:blipFill>
+        <a:effectLst/>
+      </p:bgPr>
+    </p:bg>
+    <p:spTree>
+      <p:nvGrpSpPr>
+        <p:cNvPr id="1" name=""/>
+        <p:cNvGrpSpPr/>
+        <p:nvPr/>
+      </p:nvGrpSpPr>
+      <p:grpSpPr>
+        <a:xfrm>
+          <a:off x="0" y="0"/>
+          <a:ext cx="0" cy="0"/>
+          <a:chOff x="0" y="0"/>
+          <a:chExt cx="0" cy="0"/>
+        </a:xfrm>
+      </p:grpSpPr>
+      <p:sp>
+        <p:nvSpPr>
+          <p:cNvPr id="2" name="Título 1">
+            <a:extLst>
+              <a:ext uri="{FF2B5EF4-FFF2-40B4-BE49-F238E27FC236}">
+                <a16:creationId xmlns:a16="http://schemas.microsoft.com/office/drawing/2014/main" xmlns="" id="{90D38644-861F-49D4-961C-8125C843D401}"/>
+              </a:ext>
+            </a:extLst>
+          </p:cNvPr>
+          <p:cNvSpPr>
+            <a:spLocks noGrp="1"/>
+          </p:cNvSpPr>
+          <p:nvPr>
+            <p:ph type="title"/>
+          </p:nvPr>
+        </p:nvSpPr>
+        <p:spPr/>
+        <p:txBody>
+          <a:bodyPr/>
+          <a:lstStyle/>
+          <a:p>
+            <a:r>
+              <a:rPr lang="es-ES" dirty="0" smtClean="0">
+                <a:solidFill>
+                  <a:schemeClr val="accent2">
+                    <a:lumMod val="75000"/>
+                  </a:schemeClr>
+                </a:solidFill>
+              </a:rPr>
+              <a:t>Planificación</a:t>
+            </a:r>
+            <a:endParaRPr lang="es-ES" dirty="0">
+              <a:solidFill>
+                <a:schemeClr val="accent2">
+                  <a:lumMod val="75000"/>
+                </a:schemeClr>
+              </a:solidFill>
+            </a:endParaRPr>
+          </a:p>
+        </p:txBody>
+      </p:sp>
+      <p:sp>
+        <p:nvSpPr>
+          <p:cNvPr id="15" name="CuadroTexto 14"/>
+          <p:cNvSpPr txBox="1"/>
+          <p:nvPr/>
+        </p:nvSpPr>
+        <p:spPr>
+          <a:xfrm>
+            <a:off x="957263" y="1557565"/>
+            <a:ext cx="1632755" cy="369332"/>
+          </a:xfrm>
+          <a:prstGeom prst="rect">
+            <a:avLst/>
+          </a:prstGeom>
+          <a:noFill/>
+        </p:spPr>
+        <p:txBody>
+          <a:bodyPr wrap="none" rtlCol="0">
+            <a:spAutoFit/>
+          </a:bodyPr>
+          <a:lstStyle/>
+          <a:p>
+            <a:r>
+              <a:rPr lang="es-ES_tradnl" dirty="0" smtClean="0">
+                <a:solidFill>
+                  <a:schemeClr val="accent2"/>
+                </a:solidFill>
+              </a:rPr>
+              <a:t>Primer Sprint:</a:t>
+            </a:r>
+            <a:endParaRPr lang="es-ES_tradnl" dirty="0">
+              <a:solidFill>
+                <a:schemeClr val="accent2"/>
+              </a:solidFill>
+            </a:endParaRPr>
+          </a:p>
+        </p:txBody>
+      </p:sp>
+      <p:pic>
+        <p:nvPicPr>
+          <p:cNvPr id="5" name="Imagen 4"/>
+          <p:cNvPicPr/>
+          <p:nvPr/>
+        </p:nvPicPr>
+        <p:blipFill>
+          <a:blip r:embed="rId3">
+            <a:extLst>
+              <a:ext uri="{28A0092B-C50C-407E-A947-70E740481C1C}">
+                <a14:useLocalDpi xmlns:a14="http://schemas.microsoft.com/office/drawing/2010/main" val="0"/>
+              </a:ext>
+            </a:extLst>
+          </a:blip>
+          <a:srcRect/>
+          <a:stretch>
+            <a:fillRect/>
+          </a:stretch>
+        </p:blipFill>
+        <p:spPr bwMode="auto">
+          <a:xfrm>
+            <a:off x="2590018" y="1926897"/>
+            <a:ext cx="5982482" cy="4030991"/>
+          </a:xfrm>
+          <a:prstGeom prst="rect">
+            <a:avLst/>
+          </a:prstGeom>
+          <a:noFill/>
+          <a:ln>
+            <a:noFill/>
+          </a:ln>
+        </p:spPr>
+      </p:pic>
+    </p:spTree>
+    <p:extLst>
+      <p:ext uri="{BB962C8B-B14F-4D97-AF65-F5344CB8AC3E}">
+        <p14:creationId xmlns:p14="http://schemas.microsoft.com/office/powerpoint/2010/main" val="1011284976"/>
+      </p:ext>
+    </p:extLst>
+  </p:cSld>
+  <p:clrMapOvr>
+    <a:masterClrMapping/>
+  </p:clrMapOvr>
+</p:sld>
+</file>
+
+<file path=ppt/slides/slide6.xml><?xml version="1.0" encoding="utf-8"?>
+<p:sld xmlns:a="http://schemas.openxmlformats.org/drawingml/2006/main" xmlns:r="http://schemas.openxmlformats.org/officeDocument/2006/relationships" xmlns:p="http://schemas.openxmlformats.org/presentationml/2006/main">
+  <p:cSld>
+    <p:bg>
+      <p:bgPr>
+        <a:blipFill dpi="0" rotWithShape="1">
+          <a:blip r:embed="rId2">
+            <a:lum/>
+          </a:blip>
+          <a:srcRect/>
+          <a:stretch>
+            <a:fillRect/>
+          </a:stretch>
+        </a:blipFill>
+        <a:effectLst/>
+      </p:bgPr>
+    </p:bg>
+    <p:spTree>
+      <p:nvGrpSpPr>
+        <p:cNvPr id="1" name=""/>
+        <p:cNvGrpSpPr/>
+        <p:nvPr/>
+      </p:nvGrpSpPr>
+      <p:grpSpPr>
+        <a:xfrm>
+          <a:off x="0" y="0"/>
+          <a:ext cx="0" cy="0"/>
+          <a:chOff x="0" y="0"/>
+          <a:chExt cx="0" cy="0"/>
+        </a:xfrm>
+      </p:grpSpPr>
+      <p:sp>
+        <p:nvSpPr>
+          <p:cNvPr id="2" name="Título 1">
+            <a:extLst>
+              <a:ext uri="{FF2B5EF4-FFF2-40B4-BE49-F238E27FC236}">
+                <a16:creationId xmlns:a16="http://schemas.microsoft.com/office/drawing/2014/main" xmlns="" id="{90D38644-861F-49D4-961C-8125C843D401}"/>
+              </a:ext>
+            </a:extLst>
+          </p:cNvPr>
+          <p:cNvSpPr>
+            <a:spLocks noGrp="1"/>
+          </p:cNvSpPr>
+          <p:nvPr>
+            <p:ph type="title"/>
+          </p:nvPr>
+        </p:nvSpPr>
+        <p:spPr/>
+        <p:txBody>
+          <a:bodyPr/>
+          <a:lstStyle/>
+          <a:p>
+            <a:r>
+              <a:rPr lang="es-ES" dirty="0" smtClean="0">
+                <a:solidFill>
+                  <a:schemeClr val="accent2">
+                    <a:lumMod val="75000"/>
+                  </a:schemeClr>
+                </a:solidFill>
+              </a:rPr>
+              <a:t>Planificación</a:t>
+            </a:r>
+            <a:endParaRPr lang="es-ES" dirty="0">
+              <a:solidFill>
+                <a:schemeClr val="accent2">
+                  <a:lumMod val="75000"/>
+                </a:schemeClr>
+              </a:solidFill>
+            </a:endParaRPr>
+          </a:p>
+        </p:txBody>
+      </p:sp>
+      <p:sp>
+        <p:nvSpPr>
+          <p:cNvPr id="15" name="CuadroTexto 14"/>
+          <p:cNvSpPr txBox="1"/>
+          <p:nvPr/>
+        </p:nvSpPr>
+        <p:spPr>
+          <a:xfrm>
+            <a:off x="957263" y="1557565"/>
+            <a:ext cx="1808508" cy="369332"/>
+          </a:xfrm>
+          <a:prstGeom prst="rect">
+            <a:avLst/>
+          </a:prstGeom>
+          <a:noFill/>
+        </p:spPr>
+        <p:txBody>
+          <a:bodyPr wrap="none" rtlCol="0">
+            <a:spAutoFit/>
+          </a:bodyPr>
+          <a:lstStyle/>
+          <a:p>
+            <a:r>
+              <a:rPr lang="es-ES_tradnl" dirty="0" smtClean="0">
+                <a:solidFill>
+                  <a:schemeClr val="accent2"/>
+                </a:solidFill>
+              </a:rPr>
+              <a:t>Segundo Sprint:</a:t>
+            </a:r>
+            <a:endParaRPr lang="es-ES_tradnl" dirty="0">
+              <a:solidFill>
+                <a:schemeClr val="accent2"/>
+              </a:solidFill>
+            </a:endParaRPr>
+          </a:p>
+        </p:txBody>
+      </p:sp>
+      <p:pic>
+        <p:nvPicPr>
+          <p:cNvPr id="6" name="Imagen 5"/>
+          <p:cNvPicPr/>
+          <p:nvPr/>
+        </p:nvPicPr>
+        <p:blipFill>
+          <a:blip r:embed="rId3">
+            <a:extLst>
+              <a:ext uri="{28A0092B-C50C-407E-A947-70E740481C1C}">
+                <a14:useLocalDpi xmlns:a14="http://schemas.microsoft.com/office/drawing/2010/main" val="0"/>
+              </a:ext>
+            </a:extLst>
+          </a:blip>
+          <a:srcRect/>
+          <a:stretch>
+            <a:fillRect/>
+          </a:stretch>
+        </p:blipFill>
+        <p:spPr bwMode="auto">
+          <a:xfrm>
+            <a:off x="2765771" y="1926897"/>
+            <a:ext cx="6205855" cy="4191000"/>
+          </a:xfrm>
+          <a:prstGeom prst="rect">
+            <a:avLst/>
+          </a:prstGeom>
+          <a:noFill/>
+          <a:ln>
+            <a:noFill/>
+          </a:ln>
+        </p:spPr>
+      </p:pic>
+    </p:spTree>
+    <p:extLst>
+      <p:ext uri="{BB962C8B-B14F-4D97-AF65-F5344CB8AC3E}">
+        <p14:creationId xmlns:p14="http://schemas.microsoft.com/office/powerpoint/2010/main" val="1580207628"/>
+      </p:ext>
+    </p:extLst>
+  </p:cSld>
+  <p:clrMapOvr>
+    <a:masterClrMapping/>
+  </p:clrMapOvr>
+</p:sld>
+</file>
+
+<file path=ppt/slides/slide7.xml><?xml version="1.0" encoding="utf-8"?>
+<p:sld xmlns:a="http://schemas.openxmlformats.org/drawingml/2006/main" xmlns:r="http://schemas.openxmlformats.org/officeDocument/2006/relationships" xmlns:p="http://schemas.openxmlformats.org/presentationml/2006/main">
+  <p:cSld>
+    <p:bg>
+      <p:bgPr>
+        <a:blipFill dpi="0" rotWithShape="1">
+          <a:blip r:embed="rId2">
+            <a:lum/>
+          </a:blip>
+          <a:srcRect/>
+          <a:stretch>
+            <a:fillRect/>
+          </a:stretch>
+        </a:blipFill>
+        <a:effectLst/>
+      </p:bgPr>
+    </p:bg>
+    <p:spTree>
+      <p:nvGrpSpPr>
+        <p:cNvPr id="1" name=""/>
+        <p:cNvGrpSpPr/>
+        <p:nvPr/>
+      </p:nvGrpSpPr>
+      <p:grpSpPr>
+        <a:xfrm>
+          <a:off x="0" y="0"/>
+          <a:ext cx="0" cy="0"/>
+          <a:chOff x="0" y="0"/>
+          <a:chExt cx="0" cy="0"/>
+        </a:xfrm>
+      </p:grpSpPr>
+      <p:sp>
+        <p:nvSpPr>
+          <p:cNvPr id="2" name="Título 1">
+            <a:extLst>
+              <a:ext uri="{FF2B5EF4-FFF2-40B4-BE49-F238E27FC236}">
+                <a16:creationId xmlns:a16="http://schemas.microsoft.com/office/drawing/2014/main" xmlns="" id="{90D38644-861F-49D4-961C-8125C843D401}"/>
+              </a:ext>
+            </a:extLst>
+          </p:cNvPr>
+          <p:cNvSpPr>
+            <a:spLocks noGrp="1"/>
+          </p:cNvSpPr>
+          <p:nvPr>
+            <p:ph type="title"/>
+          </p:nvPr>
+        </p:nvSpPr>
+        <p:spPr/>
+        <p:txBody>
+          <a:bodyPr/>
+          <a:lstStyle/>
+          <a:p>
+            <a:r>
+              <a:rPr lang="es-ES" dirty="0" smtClean="0">
+                <a:solidFill>
+                  <a:schemeClr val="accent2">
+                    <a:lumMod val="75000"/>
+                  </a:schemeClr>
+                </a:solidFill>
+              </a:rPr>
+              <a:t>Planificación</a:t>
+            </a:r>
+            <a:endParaRPr lang="es-ES" dirty="0">
+              <a:solidFill>
+                <a:schemeClr val="accent2">
+                  <a:lumMod val="75000"/>
+                </a:schemeClr>
+              </a:solidFill>
+            </a:endParaRPr>
+          </a:p>
+        </p:txBody>
+      </p:sp>
+      <p:sp>
+        <p:nvSpPr>
+          <p:cNvPr id="15" name="CuadroTexto 14"/>
+          <p:cNvSpPr txBox="1"/>
+          <p:nvPr/>
+        </p:nvSpPr>
+        <p:spPr>
+          <a:xfrm>
+            <a:off x="957263" y="1557565"/>
+            <a:ext cx="1603581" cy="369332"/>
+          </a:xfrm>
+          <a:prstGeom prst="rect">
+            <a:avLst/>
+          </a:prstGeom>
+          <a:noFill/>
+        </p:spPr>
+        <p:txBody>
+          <a:bodyPr wrap="none" rtlCol="0">
+            <a:spAutoFit/>
+          </a:bodyPr>
+          <a:lstStyle/>
+          <a:p>
+            <a:r>
+              <a:rPr lang="es-ES_tradnl" dirty="0" smtClean="0">
+                <a:solidFill>
+                  <a:schemeClr val="accent2"/>
+                </a:solidFill>
+              </a:rPr>
+              <a:t>Tercer Sprint:</a:t>
+            </a:r>
+            <a:endParaRPr lang="es-ES_tradnl" dirty="0">
+              <a:solidFill>
+                <a:schemeClr val="accent2"/>
+              </a:solidFill>
+            </a:endParaRPr>
+          </a:p>
+        </p:txBody>
+      </p:sp>
+      <p:pic>
+        <p:nvPicPr>
+          <p:cNvPr id="5" name="Imagen 4"/>
+          <p:cNvPicPr/>
+          <p:nvPr/>
+        </p:nvPicPr>
+        <p:blipFill>
+          <a:blip r:embed="rId3">
+            <a:extLst>
+              <a:ext uri="{28A0092B-C50C-407E-A947-70E740481C1C}">
+                <a14:useLocalDpi xmlns:a14="http://schemas.microsoft.com/office/drawing/2010/main" val="0"/>
+              </a:ext>
+            </a:extLst>
+          </a:blip>
+          <a:srcRect/>
+          <a:stretch>
+            <a:fillRect/>
+          </a:stretch>
+        </p:blipFill>
+        <p:spPr bwMode="auto">
+          <a:xfrm>
+            <a:off x="2560844" y="1926897"/>
+            <a:ext cx="6280785" cy="1667641"/>
+          </a:xfrm>
+          <a:prstGeom prst="rect">
+            <a:avLst/>
+          </a:prstGeom>
+          <a:noFill/>
+          <a:ln>
+            <a:noFill/>
+          </a:ln>
+        </p:spPr>
+      </p:pic>
+    </p:spTree>
+    <p:extLst>
+      <p:ext uri="{BB962C8B-B14F-4D97-AF65-F5344CB8AC3E}">
+        <p14:creationId xmlns:p14="http://schemas.microsoft.com/office/powerpoint/2010/main" val="1139068610"/>
+      </p:ext>
+    </p:extLst>
+  </p:cSld>
+  <p:clrMapOvr>
+    <a:masterClrMapping/>
+  </p:clrMapOvr>
+</p:sld>
+</file>
+
+<file path=ppt/slides/slide8.xml><?xml version="1.0" encoding="utf-8"?>
+<p:sld xmlns:a="http://schemas.openxmlformats.org/drawingml/2006/main" xmlns:r="http://schemas.openxmlformats.org/officeDocument/2006/relationships" xmlns:p="http://schemas.openxmlformats.org/presentationml/2006/main">
+  <p:cSld>
+    <p:bg>
+      <p:bgPr>
+        <a:blipFill dpi="0" rotWithShape="1">
+          <a:blip r:embed="rId2">
+            <a:lum/>
+          </a:blip>
+          <a:srcRect/>
+          <a:stretch>
+            <a:fillRect/>
+          </a:stretch>
+        </a:blipFill>
+        <a:effectLst/>
+      </p:bgPr>
+    </p:bg>
+    <p:spTree>
+      <p:nvGrpSpPr>
+        <p:cNvPr id="1" name=""/>
+        <p:cNvGrpSpPr/>
+        <p:nvPr/>
+      </p:nvGrpSpPr>
+      <p:grpSpPr>
+        <a:xfrm>
+          <a:off x="0" y="0"/>
+          <a:ext cx="0" cy="0"/>
+          <a:chOff x="0" y="0"/>
+          <a:chExt cx="0" cy="0"/>
+        </a:xfrm>
+      </p:grpSpPr>
+      <p:sp>
+        <p:nvSpPr>
+          <p:cNvPr id="2" name="Título 1">
+            <a:extLst>
+              <a:ext uri="{FF2B5EF4-FFF2-40B4-BE49-F238E27FC236}">
+                <a16:creationId xmlns:a16="http://schemas.microsoft.com/office/drawing/2014/main" xmlns="" id="{90D38644-861F-49D4-961C-8125C843D401}"/>
+              </a:ext>
+            </a:extLst>
+          </p:cNvPr>
+          <p:cNvSpPr>
+            <a:spLocks noGrp="1"/>
+          </p:cNvSpPr>
+          <p:nvPr>
+            <p:ph type="title"/>
+          </p:nvPr>
+        </p:nvSpPr>
+        <p:spPr/>
+        <p:txBody>
+          <a:bodyPr/>
+          <a:lstStyle/>
+          <a:p>
+            <a:r>
+              <a:rPr lang="es-ES" dirty="0" smtClean="0">
+                <a:solidFill>
+                  <a:schemeClr val="accent2">
+                    <a:lumMod val="75000"/>
+                  </a:schemeClr>
+                </a:solidFill>
+              </a:rPr>
+              <a:t>Casos de uso</a:t>
+            </a:r>
+            <a:endParaRPr lang="es-ES" dirty="0">
+              <a:solidFill>
+                <a:schemeClr val="accent2">
+                  <a:lumMod val="75000"/>
+                </a:schemeClr>
+              </a:solidFill>
+            </a:endParaRPr>
+          </a:p>
+        </p:txBody>
+      </p:sp>
+      <p:pic>
+        <p:nvPicPr>
+          <p:cNvPr id="7" name="Marcador de contenido 6"/>
+          <p:cNvPicPr>
+            <a:picLocks noGrp="1" noChangeAspect="1"/>
+          </p:cNvPicPr>
+          <p:nvPr>
+            <p:ph idx="1"/>
+          </p:nvPr>
+        </p:nvPicPr>
+        <p:blipFill>
+          <a:blip r:embed="rId3">
+            <a:extLst>
+              <a:ext uri="{28A0092B-C50C-407E-A947-70E740481C1C}">
+                <a14:useLocalDpi xmlns:a14="http://schemas.microsoft.com/office/drawing/2010/main" val="0"/>
+              </a:ext>
+            </a:extLst>
+          </a:blip>
+          <a:stretch>
+            <a:fillRect/>
+          </a:stretch>
+        </p:blipFill>
+        <p:spPr>
+          <a:xfrm>
+            <a:off x="677334" y="1270000"/>
+            <a:ext cx="7126014" cy="5150557"/>
+          </a:xfrm>
+        </p:spPr>
+      </p:pic>
+    </p:spTree>
+    <p:extLst>
+      <p:ext uri="{BB962C8B-B14F-4D97-AF65-F5344CB8AC3E}">
+        <p14:creationId xmlns:p14="http://schemas.microsoft.com/office/powerpoint/2010/main" val="164911270"/>
+      </p:ext>
+    </p:extLst>
+  </p:cSld>
+  <p:clrMapOvr>
+    <a:masterClrMapping/>
+  </p:clrMapOvr>
+</p:sld>
+</file>
+
+<file path=ppt/slides/slide9.xml><?xml version="1.0" encoding="utf-8"?>
+<p:sld xmlns:a="http://schemas.openxmlformats.org/drawingml/2006/main" xmlns:r="http://schemas.openxmlformats.org/officeDocument/2006/relationships" xmlns:p="http://schemas.openxmlformats.org/presentationml/2006/main">
+  <p:cSld>
+    <p:bg>
+      <p:bgPr>
+        <a:blipFill dpi="0" rotWithShape="1">
+          <a:blip r:embed="rId2">
+            <a:lum/>
+          </a:blip>
+          <a:srcRect/>
+          <a:stretch>
+            <a:fillRect/>
+          </a:stretch>
+        </a:blipFill>
+        <a:effectLst/>
+      </p:bgPr>
+    </p:bg>
+    <p:spTree>
+      <p:nvGrpSpPr>
+        <p:cNvPr id="1" name=""/>
+        <p:cNvGrpSpPr/>
+        <p:nvPr/>
+      </p:nvGrpSpPr>
+      <p:grpSpPr>
+        <a:xfrm>
+          <a:off x="0" y="0"/>
+          <a:ext cx="0" cy="0"/>
+          <a:chOff x="0" y="0"/>
+          <a:chExt cx="0" cy="0"/>
+        </a:xfrm>
+      </p:grpSpPr>
+      <p:sp>
+        <p:nvSpPr>
+          <p:cNvPr id="2" name="Título 1">
+            <a:extLst>
+              <a:ext uri="{FF2B5EF4-FFF2-40B4-BE49-F238E27FC236}">
+                <a16:creationId xmlns:a16="http://schemas.microsoft.com/office/drawing/2014/main" xmlns="" id="{90D38644-861F-49D4-961C-8125C843D401}"/>
+              </a:ext>
+            </a:extLst>
+          </p:cNvPr>
+          <p:cNvSpPr>
+            <a:spLocks noGrp="1"/>
+          </p:cNvSpPr>
+          <p:nvPr>
+            <p:ph type="title"/>
+          </p:nvPr>
+        </p:nvSpPr>
+        <p:spPr/>
+        <p:txBody>
+          <a:bodyPr/>
+          <a:lstStyle/>
+          <a:p>
+            <a:r>
+              <a:rPr lang="es-ES" dirty="0">
+                <a:solidFill>
+                  <a:schemeClr val="accent2">
+                    <a:lumMod val="75000"/>
+                  </a:schemeClr>
+                </a:solidFill>
+              </a:rPr>
+              <a:t>Diagrama de clases</a:t>
+            </a:r>
+          </a:p>
+        </p:txBody>
+      </p:sp>
+      <p:pic>
+        <p:nvPicPr>
+          <p:cNvPr id="5" name="Marcador de contenido 4"/>
+          <p:cNvPicPr>
+            <a:picLocks noGrp="1" noChangeAspect="1"/>
+          </p:cNvPicPr>
+          <p:nvPr>
+            <p:ph idx="1"/>
+          </p:nvPr>
+        </p:nvPicPr>
+        <p:blipFill>
+          <a:blip r:embed="rId3">
+            <a:extLst>
+              <a:ext uri="{28A0092B-C50C-407E-A947-70E740481C1C}">
+                <a14:useLocalDpi xmlns:a14="http://schemas.microsoft.com/office/drawing/2010/main" val="0"/>
+              </a:ext>
+            </a:extLst>
+          </a:blip>
+          <a:stretch>
+            <a:fillRect/>
+          </a:stretch>
+        </p:blipFill>
+        <p:spPr>
+          <a:xfrm>
+            <a:off x="677334" y="1372312"/>
+            <a:ext cx="8763074" cy="4008985"/>
+          </a:xfrm>
+        </p:spPr>
+      </p:pic>
+    </p:spTree>
+    <p:extLst>
+      <p:ext uri="{BB962C8B-B14F-4D97-AF65-F5344CB8AC3E}">
+        <p14:creationId xmlns:p14="http://schemas.microsoft.com/office/powerpoint/2010/main" val="4063721181"/>
       </p:ext>
     </p:extLst>
   </p:cSld>

</xml_diff>

<commit_message>
Cambiado foto segundo sprint
</commit_message>
<xml_diff>
--- a/7_Presentacion/Presentacion.pptx
+++ b/7_Presentacion/Presentacion.pptx
@@ -869,7 +869,7 @@
           <a:p>
             <a:fld id="{48A87A34-81AB-432B-8DAE-1953F412C126}" type="datetimeFigureOut">
               <a:rPr lang="en-US" smtClean="0"/>
-              <a:t>5/29/18</a:t>
+              <a:t>6/3/2018</a:t>
             </a:fld>
             <a:endParaRPr lang="en-US" dirty="0"/>
           </a:p>
@@ -911,7 +911,7 @@
           <a:p>
             <a:fld id="{6D22F896-40B5-4ADD-8801-0D06FADFA095}" type="slidenum">
               <a:rPr lang="en-US" smtClean="0"/>
-              <a:t>‹Nr.›</a:t>
+              <a:t>‹Nº›</a:t>
             </a:fld>
             <a:endParaRPr lang="en-US" dirty="0"/>
           </a:p>
@@ -1121,7 +1121,7 @@
             <a:fld id="{48A87A34-81AB-432B-8DAE-1953F412C126}" type="datetimeFigureOut">
               <a:rPr lang="en-US" smtClean="0"/>
               <a:pPr/>
-              <a:t>5/29/18</a:t>
+              <a:t>6/3/2018</a:t>
             </a:fld>
             <a:endParaRPr lang="en-US" dirty="0"/>
           </a:p>
@@ -1164,7 +1164,7 @@
             <a:fld id="{6D22F896-40B5-4ADD-8801-0D06FADFA095}" type="slidenum">
               <a:rPr lang="en-US" smtClean="0"/>
               <a:pPr/>
-              <a:t>‹Nr.›</a:t>
+              <a:t>‹Nº›</a:t>
             </a:fld>
             <a:endParaRPr lang="en-US" dirty="0"/>
           </a:p>
@@ -1437,7 +1437,7 @@
             <a:fld id="{48A87A34-81AB-432B-8DAE-1953F412C126}" type="datetimeFigureOut">
               <a:rPr lang="en-US" smtClean="0"/>
               <a:pPr/>
-              <a:t>5/29/18</a:t>
+              <a:t>6/3/2018</a:t>
             </a:fld>
             <a:endParaRPr lang="en-US" dirty="0"/>
           </a:p>
@@ -1480,7 +1480,7 @@
             <a:fld id="{6D22F896-40B5-4ADD-8801-0D06FADFA095}" type="slidenum">
               <a:rPr lang="en-US" smtClean="0"/>
               <a:pPr/>
-              <a:t>‹Nr.›</a:t>
+              <a:t>‹Nº›</a:t>
             </a:fld>
             <a:endParaRPr lang="en-US" dirty="0"/>
           </a:p>
@@ -1772,7 +1772,7 @@
             <a:fld id="{48A87A34-81AB-432B-8DAE-1953F412C126}" type="datetimeFigureOut">
               <a:rPr lang="en-US" smtClean="0"/>
               <a:pPr/>
-              <a:t>5/29/18</a:t>
+              <a:t>6/3/2018</a:t>
             </a:fld>
             <a:endParaRPr lang="en-US" dirty="0"/>
           </a:p>
@@ -1815,7 +1815,7 @@
             <a:fld id="{6D22F896-40B5-4ADD-8801-0D06FADFA095}" type="slidenum">
               <a:rPr lang="en-US" smtClean="0"/>
               <a:pPr/>
-              <a:t>‹Nr.›</a:t>
+              <a:t>‹Nº›</a:t>
             </a:fld>
             <a:endParaRPr lang="en-US" dirty="0"/>
           </a:p>
@@ -2088,7 +2088,7 @@
             <a:fld id="{48A87A34-81AB-432B-8DAE-1953F412C126}" type="datetimeFigureOut">
               <a:rPr lang="en-US" smtClean="0"/>
               <a:pPr/>
-              <a:t>5/29/18</a:t>
+              <a:t>6/3/2018</a:t>
             </a:fld>
             <a:endParaRPr lang="en-US" dirty="0"/>
           </a:p>
@@ -2131,7 +2131,7 @@
             <a:fld id="{6D22F896-40B5-4ADD-8801-0D06FADFA095}" type="slidenum">
               <a:rPr lang="en-US" smtClean="0"/>
               <a:pPr/>
-              <a:t>‹Nr.›</a:t>
+              <a:t>‹Nº›</a:t>
             </a:fld>
             <a:endParaRPr lang="en-US" dirty="0"/>
           </a:p>
@@ -2483,7 +2483,7 @@
             <a:fld id="{48A87A34-81AB-432B-8DAE-1953F412C126}" type="datetimeFigureOut">
               <a:rPr lang="en-US" smtClean="0"/>
               <a:pPr/>
-              <a:t>5/29/18</a:t>
+              <a:t>6/3/2018</a:t>
             </a:fld>
             <a:endParaRPr lang="en-US" dirty="0"/>
           </a:p>
@@ -2526,7 +2526,7 @@
             <a:fld id="{6D22F896-40B5-4ADD-8801-0D06FADFA095}" type="slidenum">
               <a:rPr lang="en-US" smtClean="0"/>
               <a:pPr/>
-              <a:t>‹Nr.›</a:t>
+              <a:t>‹Nº›</a:t>
             </a:fld>
             <a:endParaRPr lang="en-US" dirty="0"/>
           </a:p>
@@ -2654,7 +2654,7 @@
           <a:p>
             <a:fld id="{48A87A34-81AB-432B-8DAE-1953F412C126}" type="datetimeFigureOut">
               <a:rPr lang="en-US" smtClean="0"/>
-              <a:t>5/29/18</a:t>
+              <a:t>6/3/2018</a:t>
             </a:fld>
             <a:endParaRPr lang="en-US" dirty="0"/>
           </a:p>
@@ -2696,7 +2696,7 @@
           <a:p>
             <a:fld id="{6D22F896-40B5-4ADD-8801-0D06FADFA095}" type="slidenum">
               <a:rPr lang="en-US" smtClean="0"/>
-              <a:t>‹Nr.›</a:t>
+              <a:t>‹Nº›</a:t>
             </a:fld>
             <a:endParaRPr lang="en-US" dirty="0"/>
           </a:p>
@@ -2835,7 +2835,7 @@
             <a:fld id="{48A87A34-81AB-432B-8DAE-1953F412C126}" type="datetimeFigureOut">
               <a:rPr lang="en-US" smtClean="0"/>
               <a:pPr/>
-              <a:t>5/29/18</a:t>
+              <a:t>6/3/2018</a:t>
             </a:fld>
             <a:endParaRPr lang="en-US" dirty="0"/>
           </a:p>
@@ -2877,7 +2877,7 @@
           <a:p>
             <a:fld id="{6D22F896-40B5-4ADD-8801-0D06FADFA095}" type="slidenum">
               <a:rPr lang="en-US" smtClean="0"/>
-              <a:t>‹Nr.›</a:t>
+              <a:t>‹Nº›</a:t>
             </a:fld>
             <a:endParaRPr lang="en-US" dirty="0"/>
           </a:p>
@@ -3005,7 +3005,7 @@
           <a:p>
             <a:fld id="{48A87A34-81AB-432B-8DAE-1953F412C126}" type="datetimeFigureOut">
               <a:rPr lang="en-US" smtClean="0"/>
-              <a:t>5/29/18</a:t>
+              <a:t>6/3/2018</a:t>
             </a:fld>
             <a:endParaRPr lang="en-US" dirty="0"/>
           </a:p>
@@ -3047,7 +3047,7 @@
           <a:p>
             <a:fld id="{6D22F896-40B5-4ADD-8801-0D06FADFA095}" type="slidenum">
               <a:rPr lang="en-US" smtClean="0"/>
-              <a:t>‹Nr.›</a:t>
+              <a:t>‹Nº›</a:t>
             </a:fld>
             <a:endParaRPr lang="en-US" dirty="0"/>
           </a:p>
@@ -3253,7 +3253,7 @@
             <a:fld id="{48A87A34-81AB-432B-8DAE-1953F412C126}" type="datetimeFigureOut">
               <a:rPr lang="en-US" smtClean="0"/>
               <a:pPr/>
-              <a:t>5/29/18</a:t>
+              <a:t>6/3/2018</a:t>
             </a:fld>
             <a:endParaRPr lang="en-US" dirty="0"/>
           </a:p>
@@ -3295,7 +3295,7 @@
           <a:p>
             <a:fld id="{6D22F896-40B5-4ADD-8801-0D06FADFA095}" type="slidenum">
               <a:rPr lang="en-US" smtClean="0"/>
-              <a:t>‹Nr.›</a:t>
+              <a:t>‹Nº›</a:t>
             </a:fld>
             <a:endParaRPr lang="en-US" dirty="0"/>
           </a:p>
@@ -3485,7 +3485,7 @@
           <a:p>
             <a:fld id="{48A87A34-81AB-432B-8DAE-1953F412C126}" type="datetimeFigureOut">
               <a:rPr lang="en-US" smtClean="0"/>
-              <a:t>5/29/18</a:t>
+              <a:t>6/3/2018</a:t>
             </a:fld>
             <a:endParaRPr lang="en-US" dirty="0"/>
           </a:p>
@@ -3527,7 +3527,7 @@
           <a:p>
             <a:fld id="{6D22F896-40B5-4ADD-8801-0D06FADFA095}" type="slidenum">
               <a:rPr lang="en-US" smtClean="0"/>
-              <a:t>‹Nr.›</a:t>
+              <a:t>‹Nº›</a:t>
             </a:fld>
             <a:endParaRPr lang="en-US" dirty="0"/>
           </a:p>
@@ -3859,7 +3859,7 @@
           <a:p>
             <a:fld id="{48A87A34-81AB-432B-8DAE-1953F412C126}" type="datetimeFigureOut">
               <a:rPr lang="en-US" smtClean="0"/>
-              <a:t>5/29/18</a:t>
+              <a:t>6/3/2018</a:t>
             </a:fld>
             <a:endParaRPr lang="en-US" dirty="0"/>
           </a:p>
@@ -3901,7 +3901,7 @@
           <a:p>
             <a:fld id="{6D22F896-40B5-4ADD-8801-0D06FADFA095}" type="slidenum">
               <a:rPr lang="en-US" smtClean="0"/>
-              <a:t>‹Nr.›</a:t>
+              <a:t>‹Nº›</a:t>
             </a:fld>
             <a:endParaRPr lang="en-US" dirty="0"/>
           </a:p>
@@ -3982,7 +3982,7 @@
           <a:p>
             <a:fld id="{48A87A34-81AB-432B-8DAE-1953F412C126}" type="datetimeFigureOut">
               <a:rPr lang="en-US" smtClean="0"/>
-              <a:t>5/29/18</a:t>
+              <a:t>6/3/2018</a:t>
             </a:fld>
             <a:endParaRPr lang="en-US" dirty="0"/>
           </a:p>
@@ -4024,7 +4024,7 @@
           <a:p>
             <a:fld id="{6D22F896-40B5-4ADD-8801-0D06FADFA095}" type="slidenum">
               <a:rPr lang="en-US" smtClean="0"/>
-              <a:t>‹Nr.›</a:t>
+              <a:t>‹Nº›</a:t>
             </a:fld>
             <a:endParaRPr lang="en-US" dirty="0"/>
           </a:p>
@@ -4077,7 +4077,7 @@
           <a:p>
             <a:fld id="{48A87A34-81AB-432B-8DAE-1953F412C126}" type="datetimeFigureOut">
               <a:rPr lang="en-US" smtClean="0"/>
-              <a:t>5/29/18</a:t>
+              <a:t>6/3/2018</a:t>
             </a:fld>
             <a:endParaRPr lang="en-US" dirty="0"/>
           </a:p>
@@ -4119,7 +4119,7 @@
           <a:p>
             <a:fld id="{6D22F896-40B5-4ADD-8801-0D06FADFA095}" type="slidenum">
               <a:rPr lang="en-US" smtClean="0"/>
-              <a:t>‹Nr.›</a:t>
+              <a:t>‹Nº›</a:t>
             </a:fld>
             <a:endParaRPr lang="en-US" dirty="0"/>
           </a:p>
@@ -4332,7 +4332,7 @@
           <a:p>
             <a:fld id="{48A87A34-81AB-432B-8DAE-1953F412C126}" type="datetimeFigureOut">
               <a:rPr lang="en-US" smtClean="0"/>
-              <a:t>5/29/18</a:t>
+              <a:t>6/3/2018</a:t>
             </a:fld>
             <a:endParaRPr lang="en-US" dirty="0"/>
           </a:p>
@@ -4374,7 +4374,7 @@
           <a:p>
             <a:fld id="{6D22F896-40B5-4ADD-8801-0D06FADFA095}" type="slidenum">
               <a:rPr lang="en-US" smtClean="0"/>
-              <a:t>‹Nr.›</a:t>
+              <a:t>‹Nº›</a:t>
             </a:fld>
             <a:endParaRPr lang="en-US" dirty="0"/>
           </a:p>
@@ -4614,7 +4614,7 @@
           <a:p>
             <a:fld id="{6D22F896-40B5-4ADD-8801-0D06FADFA095}" type="slidenum">
               <a:rPr lang="en-US" smtClean="0"/>
-              <a:t>‹Nr.›</a:t>
+              <a:t>‹Nº›</a:t>
             </a:fld>
             <a:endParaRPr lang="en-US" dirty="0"/>
           </a:p>
@@ -4637,7 +4637,7 @@
           <a:p>
             <a:fld id="{48A87A34-81AB-432B-8DAE-1953F412C126}" type="datetimeFigureOut">
               <a:rPr lang="en-US" smtClean="0"/>
-              <a:t>5/29/18</a:t>
+              <a:t>6/3/2018</a:t>
             </a:fld>
             <a:endParaRPr lang="en-US" dirty="0"/>
           </a:p>
@@ -5340,7 +5340,7 @@
             <a:fld id="{48A87A34-81AB-432B-8DAE-1953F412C126}" type="datetimeFigureOut">
               <a:rPr lang="en-US" smtClean="0"/>
               <a:pPr/>
-              <a:t>5/29/18</a:t>
+              <a:t>6/3/2018</a:t>
             </a:fld>
             <a:endParaRPr lang="en-US" dirty="0"/>
           </a:p>
@@ -5417,7 +5417,7 @@
             <a:fld id="{6D22F896-40B5-4ADD-8801-0D06FADFA095}" type="slidenum">
               <a:rPr lang="en-US" smtClean="0"/>
               <a:pPr/>
-              <a:t>‹Nr.›</a:t>
+              <a:t>‹Nº›</a:t>
             </a:fld>
             <a:endParaRPr lang="en-US" dirty="0"/>
           </a:p>
@@ -5884,7 +5884,7 @@
           <p:cNvPr id="2" name="Título 1">
             <a:extLst>
               <a:ext uri="{FF2B5EF4-FFF2-40B4-BE49-F238E27FC236}">
-                <a16:creationId xmlns:a16="http://schemas.microsoft.com/office/drawing/2014/main" xmlns="" id="{FD8AECF1-5466-4FD5-817B-A14A6B4BA43F}"/>
+                <a16:creationId xmlns:a16="http://schemas.microsoft.com/office/drawing/2014/main" id="{FD8AECF1-5466-4FD5-817B-A14A6B4BA43F}"/>
               </a:ext>
             </a:extLst>
           </p:cNvPr>
@@ -5926,7 +5926,7 @@
           <p:cNvPr id="3" name="Subtítulo 2">
             <a:extLst>
               <a:ext uri="{FF2B5EF4-FFF2-40B4-BE49-F238E27FC236}">
-                <a16:creationId xmlns:a16="http://schemas.microsoft.com/office/drawing/2014/main" xmlns="" id="{36F52D52-3AF1-4AB8-AB2F-500D197725F8}"/>
+                <a16:creationId xmlns:a16="http://schemas.microsoft.com/office/drawing/2014/main" id="{36F52D52-3AF1-4AB8-AB2F-500D197725F8}"/>
               </a:ext>
             </a:extLst>
           </p:cNvPr>
@@ -6003,7 +6003,7 @@
           <p:cNvPr id="2" name="Título 1">
             <a:extLst>
               <a:ext uri="{FF2B5EF4-FFF2-40B4-BE49-F238E27FC236}">
-                <a16:creationId xmlns:a16="http://schemas.microsoft.com/office/drawing/2014/main" xmlns="" id="{CFB490EC-9EFA-41A1-AD47-69164ED0A8CE}"/>
+                <a16:creationId xmlns:a16="http://schemas.microsoft.com/office/drawing/2014/main" id="{CFB490EC-9EFA-41A1-AD47-69164ED0A8CE}"/>
               </a:ext>
             </a:extLst>
           </p:cNvPr>
@@ -6111,7 +6111,7 @@
           <p:cNvPr id="2" name="Título 1">
             <a:extLst>
               <a:ext uri="{FF2B5EF4-FFF2-40B4-BE49-F238E27FC236}">
-                <a16:creationId xmlns:a16="http://schemas.microsoft.com/office/drawing/2014/main" xmlns="" id="{6C561DC4-512B-4693-AAA6-F0784619631E}"/>
+                <a16:creationId xmlns:a16="http://schemas.microsoft.com/office/drawing/2014/main" id="{6C561DC4-512B-4693-AAA6-F0784619631E}"/>
               </a:ext>
             </a:extLst>
           </p:cNvPr>
@@ -6133,7 +6133,7 @@
           <a:lstStyle/>
           <a:p>
             <a:r>
-              <a:rPr lang="es-ES" dirty="0" smtClean="0">
+              <a:rPr lang="es-ES" dirty="0">
                 <a:solidFill>
                   <a:schemeClr val="accent2">
                     <a:lumMod val="75000"/>
@@ -6142,13 +6142,6 @@
               </a:rPr>
               <a:t>Conclusión</a:t>
             </a:r>
-            <a:endParaRPr lang="es-ES" dirty="0">
-              <a:solidFill>
-                <a:schemeClr val="accent2">
-                  <a:lumMod val="75000"/>
-                </a:schemeClr>
-              </a:solidFill>
-            </a:endParaRPr>
           </a:p>
         </p:txBody>
       </p:sp>
@@ -6157,7 +6150,7 @@
           <p:cNvPr id="3" name="Marcador de contenido 2">
             <a:extLst>
               <a:ext uri="{FF2B5EF4-FFF2-40B4-BE49-F238E27FC236}">
-                <a16:creationId xmlns:a16="http://schemas.microsoft.com/office/drawing/2014/main" xmlns="" id="{94529F7B-DC78-4DEE-9A07-E09F4DFF9ACE}"/>
+                <a16:creationId xmlns:a16="http://schemas.microsoft.com/office/drawing/2014/main" id="{94529F7B-DC78-4DEE-9A07-E09F4DFF9ACE}"/>
               </a:ext>
             </a:extLst>
           </p:cNvPr>
@@ -6179,7 +6172,7 @@
           <a:lstStyle/>
           <a:p>
             <a:r>
-              <a:rPr lang="es-ES" dirty="0" smtClean="0">
+              <a:rPr lang="es-ES" dirty="0">
                 <a:solidFill>
                   <a:schemeClr val="accent2">
                     <a:lumMod val="75000"/>
@@ -6188,13 +6181,6 @@
               </a:rPr>
               <a:t>Entender mejor que es la Ingeniería del Software.</a:t>
             </a:r>
-            <a:endParaRPr lang="es-ES" dirty="0">
-              <a:solidFill>
-                <a:schemeClr val="accent2">
-                  <a:lumMod val="75000"/>
-                </a:schemeClr>
-              </a:solidFill>
-            </a:endParaRPr>
           </a:p>
           <a:p>
             <a:r>
@@ -6205,37 +6191,20 @@
                   </a:schemeClr>
                 </a:solidFill>
               </a:rPr>
-              <a:t>Herramientas aprendidas</a:t>
-            </a:r>
-            <a:r>
-              <a:rPr lang="es-ES" dirty="0" smtClean="0">
+              <a:t>Herramientas aprendidas.</a:t>
+            </a:r>
+          </a:p>
+          <a:p>
+            <a:r>
+              <a:rPr lang="es-ES" dirty="0">
                 <a:solidFill>
                   <a:schemeClr val="accent2">
                     <a:lumMod val="75000"/>
                   </a:schemeClr>
                 </a:solidFill>
               </a:rPr>
-              <a:t>.</a:t>
-            </a:r>
-          </a:p>
-          <a:p>
-            <a:r>
-              <a:rPr lang="es-ES" dirty="0" smtClean="0">
-                <a:solidFill>
-                  <a:schemeClr val="accent2">
-                    <a:lumMod val="75000"/>
-                  </a:schemeClr>
-                </a:solidFill>
-              </a:rPr>
               <a:t>Problemas con la implementación.</a:t>
             </a:r>
-            <a:endParaRPr lang="es-ES" dirty="0">
-              <a:solidFill>
-                <a:schemeClr val="accent2">
-                  <a:lumMod val="75000"/>
-                </a:schemeClr>
-              </a:solidFill>
-            </a:endParaRPr>
           </a:p>
         </p:txBody>
       </p:sp>
@@ -6288,10 +6257,10 @@
           <p:cNvPr id="15" name="Rectangle 14">
             <a:extLst>
               <a:ext uri="{FF2B5EF4-FFF2-40B4-BE49-F238E27FC236}">
-                <a16:creationId xmlns:a16="http://schemas.microsoft.com/office/drawing/2014/main" xmlns="" id="{A65AC7D1-EAA9-48F5-B509-60A7F50BF703}"/>
+                <a16:creationId xmlns:a16="http://schemas.microsoft.com/office/drawing/2014/main" id="{A65AC7D1-EAA9-48F5-B509-60A7F50BF703}"/>
               </a:ext>
               <a:ext uri="{C183D7F6-B498-43B3-948B-1728B52AA6E4}">
-                <adec:decorative xmlns:adec="http://schemas.microsoft.com/office/drawing/2017/decorative" xmlns="" val="1"/>
+                <adec:decorative xmlns:adec="http://schemas.microsoft.com/office/drawing/2017/decorative" val="1"/>
               </a:ext>
             </a:extLst>
           </p:cNvPr>
@@ -6348,10 +6317,10 @@
           <p:cNvPr id="17" name="Rectangle 16">
             <a:extLst>
               <a:ext uri="{FF2B5EF4-FFF2-40B4-BE49-F238E27FC236}">
-                <a16:creationId xmlns:a16="http://schemas.microsoft.com/office/drawing/2014/main" xmlns="" id="{D6320AF9-619A-4175-865B-5663E1AEF4C5}"/>
+                <a16:creationId xmlns:a16="http://schemas.microsoft.com/office/drawing/2014/main" id="{D6320AF9-619A-4175-865B-5663E1AEF4C5}"/>
               </a:ext>
               <a:ext uri="{C183D7F6-B498-43B3-948B-1728B52AA6E4}">
-                <adec:decorative xmlns:adec="http://schemas.microsoft.com/office/drawing/2017/decorative" xmlns="" val="1"/>
+                <adec:decorative xmlns:adec="http://schemas.microsoft.com/office/drawing/2017/decorative" val="1"/>
               </a:ext>
             </a:extLst>
           </p:cNvPr>
@@ -6408,10 +6377,10 @@
           <p:cNvPr id="19" name="Straight Connector 18">
             <a:extLst>
               <a:ext uri="{FF2B5EF4-FFF2-40B4-BE49-F238E27FC236}">
-                <a16:creationId xmlns:a16="http://schemas.microsoft.com/office/drawing/2014/main" xmlns="" id="{063B6EC6-D752-4EE7-908B-F8F19E8C7FEA}"/>
+                <a16:creationId xmlns:a16="http://schemas.microsoft.com/office/drawing/2014/main" id="{063B6EC6-D752-4EE7-908B-F8F19E8C7FEA}"/>
               </a:ext>
               <a:ext uri="{C183D7F6-B498-43B3-948B-1728B52AA6E4}">
-                <adec:decorative xmlns:adec="http://schemas.microsoft.com/office/drawing/2017/decorative" xmlns="" val="1"/>
+                <adec:decorative xmlns:adec="http://schemas.microsoft.com/office/drawing/2017/decorative" val="1"/>
               </a:ext>
             </a:extLst>
           </p:cNvPr>
@@ -6462,10 +6431,10 @@
           <p:cNvPr id="21" name="Straight Connector 20">
             <a:extLst>
               <a:ext uri="{FF2B5EF4-FFF2-40B4-BE49-F238E27FC236}">
-                <a16:creationId xmlns:a16="http://schemas.microsoft.com/office/drawing/2014/main" xmlns="" id="{EFECD4E8-AD3E-4228-82A2-9461958EA94D}"/>
+                <a16:creationId xmlns:a16="http://schemas.microsoft.com/office/drawing/2014/main" id="{EFECD4E8-AD3E-4228-82A2-9461958EA94D}"/>
               </a:ext>
               <a:ext uri="{C183D7F6-B498-43B3-948B-1728B52AA6E4}">
-                <adec:decorative xmlns:adec="http://schemas.microsoft.com/office/drawing/2017/decorative" xmlns="" val="1"/>
+                <adec:decorative xmlns:adec="http://schemas.microsoft.com/office/drawing/2017/decorative" val="1"/>
               </a:ext>
             </a:extLst>
           </p:cNvPr>
@@ -6518,10 +6487,10 @@
           <p:cNvPr id="23" name="Rectangle 23">
             <a:extLst>
               <a:ext uri="{FF2B5EF4-FFF2-40B4-BE49-F238E27FC236}">
-                <a16:creationId xmlns:a16="http://schemas.microsoft.com/office/drawing/2014/main" xmlns="" id="{7E018740-5C2B-4A41-AC1A-7E68D1EC1954}"/>
+                <a16:creationId xmlns:a16="http://schemas.microsoft.com/office/drawing/2014/main" id="{7E018740-5C2B-4A41-AC1A-7E68D1EC1954}"/>
               </a:ext>
               <a:ext uri="{C183D7F6-B498-43B3-948B-1728B52AA6E4}">
-                <adec:decorative xmlns:adec="http://schemas.microsoft.com/office/drawing/2017/decorative" xmlns="" val="1"/>
+                <adec:decorative xmlns:adec="http://schemas.microsoft.com/office/drawing/2017/decorative" val="1"/>
               </a:ext>
             </a:extLst>
           </p:cNvPr>
@@ -6598,10 +6567,10 @@
           <p:cNvPr id="25" name="Rectangle 25">
             <a:extLst>
               <a:ext uri="{FF2B5EF4-FFF2-40B4-BE49-F238E27FC236}">
-                <a16:creationId xmlns:a16="http://schemas.microsoft.com/office/drawing/2014/main" xmlns="" id="{166F75A4-C475-4941-8EE2-B80A06A2C1BB}"/>
+                <a16:creationId xmlns:a16="http://schemas.microsoft.com/office/drawing/2014/main" id="{166F75A4-C475-4941-8EE2-B80A06A2C1BB}"/>
               </a:ext>
               <a:ext uri="{C183D7F6-B498-43B3-948B-1728B52AA6E4}">
-                <adec:decorative xmlns:adec="http://schemas.microsoft.com/office/drawing/2017/decorative" xmlns="" val="1"/>
+                <adec:decorative xmlns:adec="http://schemas.microsoft.com/office/drawing/2017/decorative" val="1"/>
               </a:ext>
             </a:extLst>
           </p:cNvPr>
@@ -6678,10 +6647,10 @@
           <p:cNvPr id="27" name="Isosceles Triangle 26">
             <a:extLst>
               <a:ext uri="{FF2B5EF4-FFF2-40B4-BE49-F238E27FC236}">
-                <a16:creationId xmlns:a16="http://schemas.microsoft.com/office/drawing/2014/main" xmlns="" id="{A032553A-72E8-4B0D-8405-FF9771C9AF05}"/>
+                <a16:creationId xmlns:a16="http://schemas.microsoft.com/office/drawing/2014/main" id="{A032553A-72E8-4B0D-8405-FF9771C9AF05}"/>
               </a:ext>
               <a:ext uri="{C183D7F6-B498-43B3-948B-1728B52AA6E4}">
-                <adec:decorative xmlns:adec="http://schemas.microsoft.com/office/drawing/2017/decorative" xmlns="" val="1"/>
+                <adec:decorative xmlns:adec="http://schemas.microsoft.com/office/drawing/2017/decorative" val="1"/>
               </a:ext>
             </a:extLst>
           </p:cNvPr>
@@ -6736,10 +6705,10 @@
           <p:cNvPr id="29" name="Rectangle 27">
             <a:extLst>
               <a:ext uri="{FF2B5EF4-FFF2-40B4-BE49-F238E27FC236}">
-                <a16:creationId xmlns:a16="http://schemas.microsoft.com/office/drawing/2014/main" xmlns="" id="{765800AC-C3B9-498E-87BC-29FAE4C76B21}"/>
+                <a16:creationId xmlns:a16="http://schemas.microsoft.com/office/drawing/2014/main" id="{765800AC-C3B9-498E-87BC-29FAE4C76B21}"/>
               </a:ext>
               <a:ext uri="{C183D7F6-B498-43B3-948B-1728B52AA6E4}">
-                <adec:decorative xmlns:adec="http://schemas.microsoft.com/office/drawing/2017/decorative" xmlns="" val="1"/>
+                <adec:decorative xmlns:adec="http://schemas.microsoft.com/office/drawing/2017/decorative" val="1"/>
               </a:ext>
             </a:extLst>
           </p:cNvPr>
@@ -6817,10 +6786,10 @@
           <p:cNvPr id="31" name="Isosceles Triangle 30">
             <a:extLst>
               <a:ext uri="{FF2B5EF4-FFF2-40B4-BE49-F238E27FC236}">
-                <a16:creationId xmlns:a16="http://schemas.microsoft.com/office/drawing/2014/main" xmlns="" id="{1F9D6ACB-2FF4-49F9-978A-E0D5327FC635}"/>
+                <a16:creationId xmlns:a16="http://schemas.microsoft.com/office/drawing/2014/main" id="{1F9D6ACB-2FF4-49F9-978A-E0D5327FC635}"/>
               </a:ext>
               <a:ext uri="{C183D7F6-B498-43B3-948B-1728B52AA6E4}">
-                <adec:decorative xmlns:adec="http://schemas.microsoft.com/office/drawing/2017/decorative" xmlns="" val="1"/>
+                <adec:decorative xmlns:adec="http://schemas.microsoft.com/office/drawing/2017/decorative" val="1"/>
               </a:ext>
             </a:extLst>
           </p:cNvPr>
@@ -6875,10 +6844,10 @@
           <p:cNvPr id="33" name="Freeform: Shape 32">
             <a:extLst>
               <a:ext uri="{FF2B5EF4-FFF2-40B4-BE49-F238E27FC236}">
-                <a16:creationId xmlns:a16="http://schemas.microsoft.com/office/drawing/2014/main" xmlns="" id="{A5EC319D-0FEA-4B95-A3EA-01E35672C95B}"/>
+                <a16:creationId xmlns:a16="http://schemas.microsoft.com/office/drawing/2014/main" id="{A5EC319D-0FEA-4B95-A3EA-01E35672C95B}"/>
               </a:ext>
               <a:ext uri="{C183D7F6-B498-43B3-948B-1728B52AA6E4}">
-                <adec:decorative xmlns:adec="http://schemas.microsoft.com/office/drawing/2017/decorative" xmlns="" val="1"/>
+                <adec:decorative xmlns:adec="http://schemas.microsoft.com/office/drawing/2017/decorative" val="1"/>
               </a:ext>
             </a:extLst>
           </p:cNvPr>
@@ -7007,7 +6976,7 @@
           <p:cNvPr id="2" name="Título 1">
             <a:extLst>
               <a:ext uri="{FF2B5EF4-FFF2-40B4-BE49-F238E27FC236}">
-                <a16:creationId xmlns:a16="http://schemas.microsoft.com/office/drawing/2014/main" xmlns="" id="{6CE925F6-2C94-4D9B-9EAC-9F7430DE48BF}"/>
+                <a16:creationId xmlns:a16="http://schemas.microsoft.com/office/drawing/2014/main" id="{6CE925F6-2C94-4D9B-9EAC-9F7430DE48BF}"/>
               </a:ext>
             </a:extLst>
           </p:cNvPr>
@@ -7120,7 +7089,7 @@
           <p:cNvPr id="2" name="Título 1">
             <a:extLst>
               <a:ext uri="{FF2B5EF4-FFF2-40B4-BE49-F238E27FC236}">
-                <a16:creationId xmlns:a16="http://schemas.microsoft.com/office/drawing/2014/main" xmlns="" id="{FF24AF6E-1F5A-4C49-9EB1-368A3E5E88EC}"/>
+                <a16:creationId xmlns:a16="http://schemas.microsoft.com/office/drawing/2014/main" id="{FF24AF6E-1F5A-4C49-9EB1-368A3E5E88EC}"/>
               </a:ext>
             </a:extLst>
           </p:cNvPr>
@@ -7157,7 +7126,7 @@
           <p:cNvPr id="5" name="Título 1">
             <a:extLst>
               <a:ext uri="{FF2B5EF4-FFF2-40B4-BE49-F238E27FC236}">
-                <a16:creationId xmlns:a16="http://schemas.microsoft.com/office/drawing/2014/main" xmlns="" id="{E17CCA9B-9543-4232-AF49-C727FCA162BD}"/>
+                <a16:creationId xmlns:a16="http://schemas.microsoft.com/office/drawing/2014/main" id="{E17CCA9B-9543-4232-AF49-C727FCA162BD}"/>
               </a:ext>
             </a:extLst>
           </p:cNvPr>
@@ -7264,7 +7233,7 @@
           <p:cNvPr id="6" name="Título 1">
             <a:extLst>
               <a:ext uri="{FF2B5EF4-FFF2-40B4-BE49-F238E27FC236}">
-                <a16:creationId xmlns:a16="http://schemas.microsoft.com/office/drawing/2014/main" xmlns="" id="{F549949C-258A-47D3-8207-C535CFA7F81E}"/>
+                <a16:creationId xmlns:a16="http://schemas.microsoft.com/office/drawing/2014/main" id="{F549949C-258A-47D3-8207-C535CFA7F81E}"/>
               </a:ext>
             </a:extLst>
           </p:cNvPr>
@@ -7371,7 +7340,7 @@
           <p:cNvPr id="8" name="Imagen 7" descr="Imagen que contiene texto&#10;&#10;Descripción generada con confianza alta">
             <a:extLst>
               <a:ext uri="{FF2B5EF4-FFF2-40B4-BE49-F238E27FC236}">
-                <a16:creationId xmlns:a16="http://schemas.microsoft.com/office/drawing/2014/main" xmlns="" id="{AAF452DB-A09B-4373-B53B-DD2E16A27191}"/>
+                <a16:creationId xmlns:a16="http://schemas.microsoft.com/office/drawing/2014/main" id="{AAF452DB-A09B-4373-B53B-DD2E16A27191}"/>
               </a:ext>
             </a:extLst>
           </p:cNvPr>
@@ -7401,7 +7370,7 @@
           <p:cNvPr id="10" name="Imagen 9">
             <a:extLst>
               <a:ext uri="{FF2B5EF4-FFF2-40B4-BE49-F238E27FC236}">
-                <a16:creationId xmlns:a16="http://schemas.microsoft.com/office/drawing/2014/main" xmlns="" id="{D8BD8AC2-6646-4056-B9BF-3E219687D519}"/>
+                <a16:creationId xmlns:a16="http://schemas.microsoft.com/office/drawing/2014/main" id="{D8BD8AC2-6646-4056-B9BF-3E219687D519}"/>
               </a:ext>
             </a:extLst>
           </p:cNvPr>
@@ -7431,7 +7400,7 @@
           <p:cNvPr id="12" name="Imagen 11">
             <a:extLst>
               <a:ext uri="{FF2B5EF4-FFF2-40B4-BE49-F238E27FC236}">
-                <a16:creationId xmlns:a16="http://schemas.microsoft.com/office/drawing/2014/main" xmlns="" id="{6EDCE439-7E40-4E16-873B-9ABB948F7D7A}"/>
+                <a16:creationId xmlns:a16="http://schemas.microsoft.com/office/drawing/2014/main" id="{6EDCE439-7E40-4E16-873B-9ABB948F7D7A}"/>
               </a:ext>
             </a:extLst>
           </p:cNvPr>
@@ -7461,7 +7430,7 @@
           <p:cNvPr id="14" name="Imagen 13">
             <a:extLst>
               <a:ext uri="{FF2B5EF4-FFF2-40B4-BE49-F238E27FC236}">
-                <a16:creationId xmlns:a16="http://schemas.microsoft.com/office/drawing/2014/main" xmlns="" id="{D66801EC-44EA-42D2-995C-06367EBB998F}"/>
+                <a16:creationId xmlns:a16="http://schemas.microsoft.com/office/drawing/2014/main" id="{D66801EC-44EA-42D2-995C-06367EBB998F}"/>
               </a:ext>
             </a:extLst>
           </p:cNvPr>
@@ -7535,7 +7504,7 @@
           <p:cNvPr id="2" name="Título 1">
             <a:extLst>
               <a:ext uri="{FF2B5EF4-FFF2-40B4-BE49-F238E27FC236}">
-                <a16:creationId xmlns:a16="http://schemas.microsoft.com/office/drawing/2014/main" xmlns="" id="{6C561DC4-512B-4693-AAA6-F0784619631E}"/>
+                <a16:creationId xmlns:a16="http://schemas.microsoft.com/office/drawing/2014/main" id="{6C561DC4-512B-4693-AAA6-F0784619631E}"/>
               </a:ext>
             </a:extLst>
           </p:cNvPr>
@@ -7563,7 +7532,7 @@
           <p:cNvPr id="3" name="Marcador de contenido 2">
             <a:extLst>
               <a:ext uri="{FF2B5EF4-FFF2-40B4-BE49-F238E27FC236}">
-                <a16:creationId xmlns:a16="http://schemas.microsoft.com/office/drawing/2014/main" xmlns="" id="{94529F7B-DC78-4DEE-9A07-E09F4DFF9ACE}"/>
+                <a16:creationId xmlns:a16="http://schemas.microsoft.com/office/drawing/2014/main" id="{94529F7B-DC78-4DEE-9A07-E09F4DFF9ACE}"/>
               </a:ext>
             </a:extLst>
           </p:cNvPr>
@@ -7726,7 +7695,7 @@
           <p:cNvPr id="2" name="Título 1">
             <a:extLst>
               <a:ext uri="{FF2B5EF4-FFF2-40B4-BE49-F238E27FC236}">
-                <a16:creationId xmlns:a16="http://schemas.microsoft.com/office/drawing/2014/main" xmlns="" id="{6C561DC4-512B-4693-AAA6-F0784619631E}"/>
+                <a16:creationId xmlns:a16="http://schemas.microsoft.com/office/drawing/2014/main" id="{6C561DC4-512B-4693-AAA6-F0784619631E}"/>
               </a:ext>
             </a:extLst>
           </p:cNvPr>
@@ -7765,7 +7734,7 @@
           <p:cNvPr id="3" name="Marcador de contenido 2">
             <a:extLst>
               <a:ext uri="{FF2B5EF4-FFF2-40B4-BE49-F238E27FC236}">
-                <a16:creationId xmlns:a16="http://schemas.microsoft.com/office/drawing/2014/main" xmlns="" id="{94529F7B-DC78-4DEE-9A07-E09F4DFF9ACE}"/>
+                <a16:creationId xmlns:a16="http://schemas.microsoft.com/office/drawing/2014/main" id="{94529F7B-DC78-4DEE-9A07-E09F4DFF9ACE}"/>
               </a:ext>
             </a:extLst>
           </p:cNvPr>
@@ -7804,25 +7773,20 @@
                   </a:schemeClr>
                 </a:solidFill>
               </a:rPr>
-              <a:t> formada por 7 estudiantes de Ingeniería de </a:t>
-            </a:r>
-            <a:r>
-              <a:rPr lang="es-ES" dirty="0" smtClean="0">
+              <a:t> formada por 7 estudiantes de Ingeniería de Software.</a:t>
+            </a:r>
+          </a:p>
+          <a:p>
+            <a:r>
+              <a:rPr lang="es-ES" dirty="0">
                 <a:solidFill>
                   <a:schemeClr val="accent2">
                     <a:lumMod val="75000"/>
                   </a:schemeClr>
                 </a:solidFill>
               </a:rPr>
-              <a:t>Software.</a:t>
-            </a:r>
-            <a:endParaRPr lang="es-ES" dirty="0">
-              <a:solidFill>
-                <a:schemeClr val="accent2">
-                  <a:lumMod val="75000"/>
-                </a:schemeClr>
-              </a:solidFill>
-            </a:endParaRPr>
+              <a:t>Nuestra idea: Aplicación enfocada a la mejora y mantenimiento de las ciudades.</a:t>
+            </a:r>
           </a:p>
           <a:p>
             <a:r>
@@ -7833,56 +7797,7 @@
                   </a:schemeClr>
                 </a:solidFill>
               </a:rPr>
-              <a:t>Nuestra idea: Aplicación enfocada a la mejora y mantenimiento de las </a:t>
-            </a:r>
-            <a:r>
-              <a:rPr lang="es-ES" dirty="0" smtClean="0">
-                <a:solidFill>
-                  <a:schemeClr val="accent2">
-                    <a:lumMod val="75000"/>
-                  </a:schemeClr>
-                </a:solidFill>
-              </a:rPr>
-              <a:t>ciudades.</a:t>
-            </a:r>
-            <a:endParaRPr lang="es-ES" dirty="0">
-              <a:solidFill>
-                <a:schemeClr val="accent2">
-                  <a:lumMod val="75000"/>
-                </a:schemeClr>
-              </a:solidFill>
-            </a:endParaRPr>
-          </a:p>
-          <a:p>
-            <a:r>
-              <a:rPr lang="es-ES" dirty="0">
-                <a:solidFill>
-                  <a:schemeClr val="accent2">
-                    <a:lumMod val="75000"/>
-                  </a:schemeClr>
-                </a:solidFill>
-              </a:rPr>
-              <a:t>Nuestra </a:t>
-            </a:r>
-            <a:r>
-              <a:rPr lang="es-ES" dirty="0" smtClean="0">
-                <a:solidFill>
-                  <a:schemeClr val="accent2">
-                    <a:lumMod val="75000"/>
-                  </a:schemeClr>
-                </a:solidFill>
-              </a:rPr>
-              <a:t>motivación: La necesidad </a:t>
-            </a:r>
-            <a:r>
-              <a:rPr lang="es-ES" dirty="0">
-                <a:solidFill>
-                  <a:schemeClr val="accent2">
-                    <a:lumMod val="75000"/>
-                  </a:schemeClr>
-                </a:solidFill>
-              </a:rPr>
-              <a:t>de infraestructura o cambios en las ciudades y la forma de manejar esta información entre Ciudadanos y Ayuntamiento.</a:t>
+              <a:t>Nuestra motivación: La necesidad de infraestructura o cambios en las ciudades y la forma de manejar esta información entre Ciudadanos y Ayuntamiento.</a:t>
             </a:r>
           </a:p>
           <a:p>
@@ -7948,7 +7863,7 @@
           <p:cNvPr id="2" name="Título 1">
             <a:extLst>
               <a:ext uri="{FF2B5EF4-FFF2-40B4-BE49-F238E27FC236}">
-                <a16:creationId xmlns:a16="http://schemas.microsoft.com/office/drawing/2014/main" xmlns="" id="{90D38644-861F-49D4-961C-8125C843D401}"/>
+                <a16:creationId xmlns:a16="http://schemas.microsoft.com/office/drawing/2014/main" id="{90D38644-861F-49D4-961C-8125C843D401}"/>
               </a:ext>
             </a:extLst>
           </p:cNvPr>
@@ -7965,7 +7880,7 @@
           <a:lstStyle/>
           <a:p>
             <a:r>
-              <a:rPr lang="es-ES" dirty="0" smtClean="0">
+              <a:rPr lang="es-ES" dirty="0">
                 <a:solidFill>
                   <a:schemeClr val="accent2">
                     <a:lumMod val="75000"/>
@@ -7974,13 +7889,6 @@
               </a:rPr>
               <a:t>Planificación</a:t>
             </a:r>
-            <a:endParaRPr lang="es-ES" dirty="0">
-              <a:solidFill>
-                <a:schemeClr val="accent2">
-                  <a:lumMod val="75000"/>
-                </a:schemeClr>
-              </a:solidFill>
-            </a:endParaRPr>
           </a:p>
         </p:txBody>
       </p:sp>
@@ -8029,18 +7937,13 @@
           <a:lstStyle/>
           <a:p>
             <a:r>
-              <a:rPr lang="es-ES_tradnl" dirty="0" smtClean="0">
+              <a:rPr lang="es-ES_tradnl" dirty="0">
                 <a:solidFill>
                   <a:schemeClr val="accent2"/>
                 </a:solidFill>
               </a:rPr>
               <a:t>Planificación general:</a:t>
             </a:r>
-            <a:endParaRPr lang="es-ES_tradnl" dirty="0">
-              <a:solidFill>
-                <a:schemeClr val="accent2"/>
-              </a:solidFill>
-            </a:endParaRPr>
           </a:p>
         </p:txBody>
       </p:sp>
@@ -8123,7 +8026,7 @@
           <p:cNvPr id="2" name="Título 1">
             <a:extLst>
               <a:ext uri="{FF2B5EF4-FFF2-40B4-BE49-F238E27FC236}">
-                <a16:creationId xmlns:a16="http://schemas.microsoft.com/office/drawing/2014/main" xmlns="" id="{90D38644-861F-49D4-961C-8125C843D401}"/>
+                <a16:creationId xmlns:a16="http://schemas.microsoft.com/office/drawing/2014/main" id="{90D38644-861F-49D4-961C-8125C843D401}"/>
               </a:ext>
             </a:extLst>
           </p:cNvPr>
@@ -8140,7 +8043,7 @@
           <a:lstStyle/>
           <a:p>
             <a:r>
-              <a:rPr lang="es-ES" dirty="0" smtClean="0">
+              <a:rPr lang="es-ES" dirty="0">
                 <a:solidFill>
                   <a:schemeClr val="accent2">
                     <a:lumMod val="75000"/>
@@ -8149,13 +8052,6 @@
               </a:rPr>
               <a:t>Planificación</a:t>
             </a:r>
-            <a:endParaRPr lang="es-ES" dirty="0">
-              <a:solidFill>
-                <a:schemeClr val="accent2">
-                  <a:lumMod val="75000"/>
-                </a:schemeClr>
-              </a:solidFill>
-            </a:endParaRPr>
           </a:p>
         </p:txBody>
       </p:sp>
@@ -8182,18 +8078,13 @@
           <a:lstStyle/>
           <a:p>
             <a:r>
-              <a:rPr lang="es-ES_tradnl" dirty="0" smtClean="0">
+              <a:rPr lang="es-ES_tradnl" dirty="0">
                 <a:solidFill>
                   <a:schemeClr val="accent2"/>
                 </a:solidFill>
               </a:rPr>
               <a:t>Primer Sprint:</a:t>
             </a:r>
-            <a:endParaRPr lang="es-ES_tradnl" dirty="0">
-              <a:solidFill>
-                <a:schemeClr val="accent2"/>
-              </a:solidFill>
-            </a:endParaRPr>
           </a:p>
         </p:txBody>
       </p:sp>
@@ -8218,7 +8109,7 @@
         </p:blipFill>
         <p:spPr bwMode="auto">
           <a:xfrm>
-            <a:off x="2590018" y="1926897"/>
+            <a:off x="2846871" y="2101558"/>
             <a:ext cx="5982482" cy="4030991"/>
           </a:xfrm>
           <a:prstGeom prst="rect">
@@ -8279,7 +8170,7 @@
           <p:cNvPr id="2" name="Título 1">
             <a:extLst>
               <a:ext uri="{FF2B5EF4-FFF2-40B4-BE49-F238E27FC236}">
-                <a16:creationId xmlns:a16="http://schemas.microsoft.com/office/drawing/2014/main" xmlns="" id="{90D38644-861F-49D4-961C-8125C843D401}"/>
+                <a16:creationId xmlns:a16="http://schemas.microsoft.com/office/drawing/2014/main" id="{90D38644-861F-49D4-961C-8125C843D401}"/>
               </a:ext>
             </a:extLst>
           </p:cNvPr>
@@ -8296,7 +8187,7 @@
           <a:lstStyle/>
           <a:p>
             <a:r>
-              <a:rPr lang="es-ES" dirty="0" smtClean="0">
+              <a:rPr lang="es-ES" dirty="0">
                 <a:solidFill>
                   <a:schemeClr val="accent2">
                     <a:lumMod val="75000"/>
@@ -8305,13 +8196,6 @@
               </a:rPr>
               <a:t>Planificación</a:t>
             </a:r>
-            <a:endParaRPr lang="es-ES" dirty="0">
-              <a:solidFill>
-                <a:schemeClr val="accent2">
-                  <a:lumMod val="75000"/>
-                </a:schemeClr>
-              </a:solidFill>
-            </a:endParaRPr>
           </a:p>
         </p:txBody>
       </p:sp>
@@ -8338,52 +8222,42 @@
           <a:lstStyle/>
           <a:p>
             <a:r>
-              <a:rPr lang="es-ES_tradnl" dirty="0" smtClean="0">
+              <a:rPr lang="es-ES_tradnl" dirty="0">
                 <a:solidFill>
                   <a:schemeClr val="accent2"/>
                 </a:solidFill>
               </a:rPr>
               <a:t>Segundo Sprint:</a:t>
             </a:r>
-            <a:endParaRPr lang="es-ES_tradnl" dirty="0">
-              <a:solidFill>
-                <a:schemeClr val="accent2"/>
-              </a:solidFill>
-            </a:endParaRPr>
           </a:p>
         </p:txBody>
       </p:sp>
       <p:pic>
         <p:nvPicPr>
-          <p:cNvPr id="6" name="Imagen 5"/>
+          <p:cNvPr id="5" name="Imagen 4">
+            <a:extLst>
+              <a:ext uri="{FF2B5EF4-FFF2-40B4-BE49-F238E27FC236}">
+                <a16:creationId xmlns:a16="http://schemas.microsoft.com/office/drawing/2014/main" id="{F0FB1EA5-D7B2-4B47-8DA4-519CC2EC28BF}"/>
+              </a:ext>
+            </a:extLst>
+          </p:cNvPr>
           <p:cNvPicPr/>
           <p:nvPr/>
         </p:nvPicPr>
         <p:blipFill>
-          <a:blip r:embed="rId3">
-            <a:extLst>
-              <a:ext uri="{28A0092B-C50C-407E-A947-70E740481C1C}">
-                <a14:useLocalDpi xmlns:a14="http://schemas.microsoft.com/office/drawing/2010/main" val="0"/>
-              </a:ext>
-            </a:extLst>
-          </a:blip>
-          <a:srcRect/>
+          <a:blip r:embed="rId3"/>
           <a:stretch>
             <a:fillRect/>
           </a:stretch>
         </p:blipFill>
-        <p:spPr bwMode="auto">
+        <p:spPr>
           <a:xfrm>
-            <a:off x="2765771" y="1926897"/>
-            <a:ext cx="6205855" cy="4191000"/>
+            <a:off x="2765771" y="2204191"/>
+            <a:ext cx="6265213" cy="4124690"/>
           </a:xfrm>
           <a:prstGeom prst="rect">
             <a:avLst/>
           </a:prstGeom>
-          <a:noFill/>
-          <a:ln>
-            <a:noFill/>
-          </a:ln>
         </p:spPr>
       </p:pic>
     </p:spTree>
@@ -8435,7 +8309,7 @@
           <p:cNvPr id="2" name="Título 1">
             <a:extLst>
               <a:ext uri="{FF2B5EF4-FFF2-40B4-BE49-F238E27FC236}">
-                <a16:creationId xmlns:a16="http://schemas.microsoft.com/office/drawing/2014/main" xmlns="" id="{90D38644-861F-49D4-961C-8125C843D401}"/>
+                <a16:creationId xmlns:a16="http://schemas.microsoft.com/office/drawing/2014/main" id="{90D38644-861F-49D4-961C-8125C843D401}"/>
               </a:ext>
             </a:extLst>
           </p:cNvPr>
@@ -8452,7 +8326,7 @@
           <a:lstStyle/>
           <a:p>
             <a:r>
-              <a:rPr lang="es-ES" dirty="0" smtClean="0">
+              <a:rPr lang="es-ES" dirty="0">
                 <a:solidFill>
                   <a:schemeClr val="accent2">
                     <a:lumMod val="75000"/>
@@ -8461,13 +8335,6 @@
               </a:rPr>
               <a:t>Planificación</a:t>
             </a:r>
-            <a:endParaRPr lang="es-ES" dirty="0">
-              <a:solidFill>
-                <a:schemeClr val="accent2">
-                  <a:lumMod val="75000"/>
-                </a:schemeClr>
-              </a:solidFill>
-            </a:endParaRPr>
           </a:p>
         </p:txBody>
       </p:sp>
@@ -8494,18 +8361,13 @@
           <a:lstStyle/>
           <a:p>
             <a:r>
-              <a:rPr lang="es-ES_tradnl" dirty="0" smtClean="0">
+              <a:rPr lang="es-ES_tradnl" dirty="0">
                 <a:solidFill>
                   <a:schemeClr val="accent2"/>
                 </a:solidFill>
               </a:rPr>
               <a:t>Tercer Sprint:</a:t>
             </a:r>
-            <a:endParaRPr lang="es-ES_tradnl" dirty="0">
-              <a:solidFill>
-                <a:schemeClr val="accent2"/>
-              </a:solidFill>
-            </a:endParaRPr>
           </a:p>
         </p:txBody>
       </p:sp>
@@ -8530,8 +8392,8 @@
         </p:blipFill>
         <p:spPr bwMode="auto">
           <a:xfrm>
-            <a:off x="2560844" y="1926897"/>
-            <a:ext cx="6280785" cy="1667641"/>
+            <a:off x="2560844" y="2435221"/>
+            <a:ext cx="6714878" cy="1987557"/>
           </a:xfrm>
           <a:prstGeom prst="rect">
             <a:avLst/>
@@ -8591,7 +8453,7 @@
           <p:cNvPr id="2" name="Título 1">
             <a:extLst>
               <a:ext uri="{FF2B5EF4-FFF2-40B4-BE49-F238E27FC236}">
-                <a16:creationId xmlns:a16="http://schemas.microsoft.com/office/drawing/2014/main" xmlns="" id="{90D38644-861F-49D4-961C-8125C843D401}"/>
+                <a16:creationId xmlns:a16="http://schemas.microsoft.com/office/drawing/2014/main" id="{90D38644-861F-49D4-961C-8125C843D401}"/>
               </a:ext>
             </a:extLst>
           </p:cNvPr>
@@ -8608,7 +8470,7 @@
           <a:lstStyle/>
           <a:p>
             <a:r>
-              <a:rPr lang="es-ES" dirty="0" smtClean="0">
+              <a:rPr lang="es-ES" dirty="0">
                 <a:solidFill>
                   <a:schemeClr val="accent2">
                     <a:lumMod val="75000"/>
@@ -8617,13 +8479,6 @@
               </a:rPr>
               <a:t>Casos de uso</a:t>
             </a:r>
-            <a:endParaRPr lang="es-ES" dirty="0">
-              <a:solidFill>
-                <a:schemeClr val="accent2">
-                  <a:lumMod val="75000"/>
-                </a:schemeClr>
-              </a:solidFill>
-            </a:endParaRPr>
           </a:p>
         </p:txBody>
       </p:sp>
@@ -8705,7 +8560,7 @@
           <p:cNvPr id="2" name="Título 1">
             <a:extLst>
               <a:ext uri="{FF2B5EF4-FFF2-40B4-BE49-F238E27FC236}">
-                <a16:creationId xmlns:a16="http://schemas.microsoft.com/office/drawing/2014/main" xmlns="" id="{90D38644-861F-49D4-961C-8125C843D401}"/>
+                <a16:creationId xmlns:a16="http://schemas.microsoft.com/office/drawing/2014/main" id="{90D38644-861F-49D4-961C-8125C843D401}"/>
               </a:ext>
             </a:extLst>
           </p:cNvPr>

</xml_diff>